<commit_message>
Adding some stuff to sort
</commit_message>
<xml_diff>
--- a/Git-introduktion_Hermods_HiQ.pptx
+++ b/Git-introduktion_Hermods_HiQ.pptx
@@ -7,10 +7,10 @@
     <p:sldMasterId id="2147483667" r:id="rId3"/>
   </p:sldMasterIdLst>
   <p:notesMasterIdLst>
-    <p:notesMasterId r:id="rId26"/>
+    <p:notesMasterId r:id="rId27"/>
   </p:notesMasterIdLst>
   <p:handoutMasterIdLst>
-    <p:handoutMasterId r:id="rId27"/>
+    <p:handoutMasterId r:id="rId28"/>
   </p:handoutMasterIdLst>
   <p:sldIdLst>
     <p:sldId id="360" r:id="rId4"/>
@@ -26,15 +26,16 @@
     <p:sldId id="362" r:id="rId14"/>
     <p:sldId id="363" r:id="rId15"/>
     <p:sldId id="364" r:id="rId16"/>
-    <p:sldId id="365" r:id="rId17"/>
-    <p:sldId id="331" r:id="rId18"/>
-    <p:sldId id="350" r:id="rId19"/>
-    <p:sldId id="353" r:id="rId20"/>
-    <p:sldId id="346" r:id="rId21"/>
-    <p:sldId id="323" r:id="rId22"/>
-    <p:sldId id="366" r:id="rId23"/>
-    <p:sldId id="326" r:id="rId24"/>
-    <p:sldId id="327" r:id="rId25"/>
+    <p:sldId id="368" r:id="rId17"/>
+    <p:sldId id="365" r:id="rId18"/>
+    <p:sldId id="331" r:id="rId19"/>
+    <p:sldId id="350" r:id="rId20"/>
+    <p:sldId id="353" r:id="rId21"/>
+    <p:sldId id="346" r:id="rId22"/>
+    <p:sldId id="323" r:id="rId23"/>
+    <p:sldId id="366" r:id="rId24"/>
+    <p:sldId id="326" r:id="rId25"/>
+    <p:sldId id="327" r:id="rId26"/>
   </p:sldIdLst>
   <p:sldSz cx="9144000" cy="6858000" type="screen4x3"/>
   <p:notesSz cx="6858000" cy="9144000"/>
@@ -7651,158 +7652,6 @@
                   <a:schemeClr val="bg1"/>
                 </a:solidFill>
               </a:endParaRPr>
-            </a:p>
-          </p:txBody>
-        </p:sp>
-      </p:grpSp>
-      <p:grpSp>
-        <p:nvGrpSpPr>
-          <p:cNvPr id="33" name="Grupp 32"/>
-          <p:cNvGrpSpPr/>
-          <p:nvPr/>
-        </p:nvGrpSpPr>
-        <p:grpSpPr>
-          <a:xfrm>
-            <a:off x="3372561" y="1930630"/>
-            <a:ext cx="1896051" cy="1066322"/>
-            <a:chOff x="3372561" y="1930630"/>
-            <a:chExt cx="1896051" cy="1066322"/>
-          </a:xfrm>
-        </p:grpSpPr>
-        <p:cxnSp>
-          <p:nvCxnSpPr>
-            <p:cNvPr id="7" name="Rak pil 6"/>
-            <p:cNvCxnSpPr/>
-            <p:nvPr/>
-          </p:nvCxnSpPr>
-          <p:spPr>
-            <a:xfrm flipH="1" flipV="1">
-              <a:off x="3372561" y="1930630"/>
-              <a:ext cx="279633" cy="504056"/>
-            </a:xfrm>
-            <a:prstGeom prst="straightConnector1">
-              <a:avLst/>
-            </a:prstGeom>
-            <a:ln w="57150">
-              <a:solidFill>
-                <a:srgbClr val="FF0000"/>
-              </a:solidFill>
-              <a:tailEnd type="arrow"/>
-            </a:ln>
-          </p:spPr>
-          <p:style>
-            <a:lnRef idx="1">
-              <a:schemeClr val="accent1"/>
-            </a:lnRef>
-            <a:fillRef idx="0">
-              <a:schemeClr val="accent1"/>
-            </a:fillRef>
-            <a:effectRef idx="0">
-              <a:schemeClr val="accent1"/>
-            </a:effectRef>
-            <a:fontRef idx="minor">
-              <a:schemeClr val="tx1"/>
-            </a:fontRef>
-          </p:style>
-        </p:cxnSp>
-        <p:sp>
-          <p:nvSpPr>
-            <p:cNvPr id="22" name="textruta 21"/>
-            <p:cNvSpPr txBox="1"/>
-            <p:nvPr/>
-          </p:nvSpPr>
-          <p:spPr bwMode="auto">
-            <a:xfrm>
-              <a:off x="3563888" y="2258288"/>
-              <a:ext cx="1704724" cy="738664"/>
-            </a:xfrm>
-            <a:prstGeom prst="rect">
-              <a:avLst/>
-            </a:prstGeom>
-            <a:noFill/>
-            <a:ln>
-              <a:noFill/>
-              <a:headEnd/>
-              <a:tailEnd/>
-            </a:ln>
-          </p:spPr>
-          <p:style>
-            <a:lnRef idx="2">
-              <a:schemeClr val="accent6"/>
-            </a:lnRef>
-            <a:fillRef idx="1">
-              <a:schemeClr val="lt1"/>
-            </a:fillRef>
-            <a:effectRef idx="0">
-              <a:schemeClr val="accent6"/>
-            </a:effectRef>
-            <a:fontRef idx="minor">
-              <a:schemeClr val="dk1"/>
-            </a:fontRef>
-          </p:style>
-          <p:txBody>
-            <a:bodyPr wrap="square" rtlCol="0">
-              <a:spAutoFit/>
-            </a:bodyPr>
-            <a:lstStyle/>
-            <a:p>
-              <a:pPr algn="ctr" eaLnBrk="0" hangingPunct="0"/>
-              <a:r>
-                <a:rPr lang="sv-SE" sz="1400" dirty="0" smtClean="0">
-                  <a:solidFill>
-                    <a:schemeClr val="tx1"/>
-                  </a:solidFill>
-                </a:rPr>
-                <a:t>RTC </a:t>
-              </a:r>
-              <a:r>
-                <a:rPr lang="sv-SE" sz="1400" dirty="0" err="1" smtClean="0">
-                  <a:solidFill>
-                    <a:schemeClr val="tx1"/>
-                  </a:solidFill>
-                </a:rPr>
-                <a:t>keeps</a:t>
-              </a:r>
-              <a:r>
-                <a:rPr lang="sv-SE" sz="1400" dirty="0" smtClean="0">
-                  <a:solidFill>
-                    <a:schemeClr val="tx1"/>
-                  </a:solidFill>
-                </a:rPr>
-                <a:t> </a:t>
-              </a:r>
-              <a:r>
-                <a:rPr lang="sv-SE" sz="1400" dirty="0" err="1" smtClean="0">
-                  <a:solidFill>
-                    <a:schemeClr val="tx1"/>
-                  </a:solidFill>
-                </a:rPr>
-                <a:t>this</a:t>
-              </a:r>
-              <a:r>
-                <a:rPr lang="sv-SE" sz="1400" dirty="0" smtClean="0">
-                  <a:solidFill>
-                    <a:schemeClr val="tx1"/>
-                  </a:solidFill>
-                </a:rPr>
-                <a:t> (and repo) on server </a:t>
-              </a:r>
-              <a:r>
-                <a:rPr lang="sv-SE" sz="1400" dirty="0" err="1" smtClean="0">
-                  <a:solidFill>
-                    <a:schemeClr val="tx1"/>
-                  </a:solidFill>
-                </a:rPr>
-                <a:t>instead</a:t>
-              </a:r>
-              <a:r>
-                <a:rPr lang="sv-SE" sz="1400" dirty="0">
-                  <a:solidFill>
-                    <a:schemeClr val="tx1"/>
-                  </a:solidFill>
-                </a:rPr>
-                <a:t>!</a:t>
-              </a:r>
             </a:p>
           </p:txBody>
         </p:sp>
@@ -8374,51 +8223,6 @@
                       </p:childTnLst>
                     </p:cTn>
                   </p:par>
-                  <p:par>
-                    <p:cTn id="39" fill="hold">
-                      <p:stCondLst>
-                        <p:cond delay="indefinite"/>
-                      </p:stCondLst>
-                      <p:childTnLst>
-                        <p:par>
-                          <p:cTn id="40" fill="hold">
-                            <p:stCondLst>
-                              <p:cond delay="0"/>
-                            </p:stCondLst>
-                            <p:childTnLst>
-                              <p:par>
-                                <p:cTn id="41" presetID="1" presetClass="entr" presetSubtype="0" fill="hold" nodeType="clickEffect">
-                                  <p:stCondLst>
-                                    <p:cond delay="0"/>
-                                  </p:stCondLst>
-                                  <p:childTnLst>
-                                    <p:set>
-                                      <p:cBhvr>
-                                        <p:cTn id="42" dur="1" fill="hold">
-                                          <p:stCondLst>
-                                            <p:cond delay="0"/>
-                                          </p:stCondLst>
-                                        </p:cTn>
-                                        <p:tgtEl>
-                                          <p:spTgt spid="33"/>
-                                        </p:tgtEl>
-                                        <p:attrNameLst>
-                                          <p:attrName>style.visibility</p:attrName>
-                                        </p:attrNameLst>
-                                      </p:cBhvr>
-                                      <p:to>
-                                        <p:strVal val="visible"/>
-                                      </p:to>
-                                    </p:set>
-                                  </p:childTnLst>
-                                </p:cTn>
-                              </p:par>
-                            </p:childTnLst>
-                          </p:cTn>
-                        </p:par>
-                      </p:childTnLst>
-                    </p:cTn>
-                  </p:par>
                 </p:childTnLst>
               </p:cTn>
               <p:prevCondLst>
@@ -9281,6 +9085,296 @@
         </p:nvSpPr>
         <p:spPr/>
         <p:txBody>
+          <a:bodyPr/>
+          <a:lstStyle/>
+          <a:p>
+            <a:endParaRPr lang="sv-SE"/>
+          </a:p>
+        </p:txBody>
+      </p:sp>
+      <p:sp>
+        <p:nvSpPr>
+          <p:cNvPr id="3" name="Platshållare för innehåll 2"/>
+          <p:cNvSpPr>
+            <a:spLocks noGrp="1"/>
+          </p:cNvSpPr>
+          <p:nvPr>
+            <p:ph sz="half" idx="1"/>
+          </p:nvPr>
+        </p:nvSpPr>
+        <p:spPr/>
+        <p:txBody>
+          <a:bodyPr/>
+          <a:lstStyle/>
+          <a:p>
+            <a:r>
+              <a:rPr lang="sv-SE" dirty="0">
+                <a:hlinkClick r:id="rId2"/>
+              </a:rPr>
+              <a:t>https://</a:t>
+            </a:r>
+            <a:r>
+              <a:rPr lang="sv-SE" dirty="0" smtClean="0">
+                <a:hlinkClick r:id="rId2"/>
+              </a:rPr>
+              <a:t>github.com/Azure/azure-content</a:t>
+            </a:r>
+            <a:r>
+              <a:rPr lang="sv-SE" dirty="0" smtClean="0"/>
+              <a:t> </a:t>
+            </a:r>
+            <a:endParaRPr lang="sv-SE" dirty="0"/>
+          </a:p>
+        </p:txBody>
+      </p:sp>
+      <p:sp>
+        <p:nvSpPr>
+          <p:cNvPr id="4" name="Platshållare för innehåll 3"/>
+          <p:cNvSpPr>
+            <a:spLocks noGrp="1"/>
+          </p:cNvSpPr>
+          <p:nvPr>
+            <p:ph sz="half" idx="2"/>
+          </p:nvPr>
+        </p:nvSpPr>
+        <p:spPr/>
+        <p:txBody>
+          <a:bodyPr/>
+          <a:lstStyle/>
+          <a:p>
+            <a:endParaRPr lang="sv-SE" dirty="0"/>
+          </a:p>
+        </p:txBody>
+      </p:sp>
+      <p:sp>
+        <p:nvSpPr>
+          <p:cNvPr id="5" name="Platshållare för bildnummer 4"/>
+          <p:cNvSpPr>
+            <a:spLocks noGrp="1"/>
+          </p:cNvSpPr>
+          <p:nvPr>
+            <p:ph type="sldNum" sz="quarter" idx="12"/>
+          </p:nvPr>
+        </p:nvSpPr>
+        <p:spPr/>
+        <p:txBody>
+          <a:bodyPr/>
+          <a:lstStyle/>
+          <a:p>
+            <a:fld id="{11DA82ED-F820-4319-BD97-F25880B325A1}" type="slidenum">
+              <a:rPr lang="en-US" smtClean="0"/>
+              <a:pPr/>
+              <a:t>14</a:t>
+            </a:fld>
+            <a:endParaRPr lang="en-US"/>
+          </a:p>
+        </p:txBody>
+      </p:sp>
+      <p:pic>
+        <p:nvPicPr>
+          <p:cNvPr id="1026" name="Picture 2"/>
+          <p:cNvPicPr>
+            <a:picLocks noChangeAspect="1" noChangeArrowheads="1"/>
+          </p:cNvPicPr>
+          <p:nvPr/>
+        </p:nvPicPr>
+        <p:blipFill>
+          <a:blip r:embed="rId3">
+            <a:extLst>
+              <a:ext uri="{28A0092B-C50C-407E-A947-70E740481C1C}">
+                <a14:useLocalDpi xmlns:a14="http://schemas.microsoft.com/office/drawing/2010/main" val="0"/>
+              </a:ext>
+            </a:extLst>
+          </a:blip>
+          <a:srcRect/>
+          <a:stretch>
+            <a:fillRect/>
+          </a:stretch>
+        </p:blipFill>
+        <p:spPr bwMode="auto">
+          <a:xfrm>
+            <a:off x="1043608" y="1988840"/>
+            <a:ext cx="5823570" cy="1524370"/>
+          </a:xfrm>
+          <a:prstGeom prst="rect">
+            <a:avLst/>
+          </a:prstGeom>
+          <a:noFill/>
+          <a:ln>
+            <a:noFill/>
+          </a:ln>
+          <a:extLst>
+            <a:ext uri="{909E8E84-426E-40DD-AFC4-6F175D3DCCD1}">
+              <a14:hiddenFill xmlns:a14="http://schemas.microsoft.com/office/drawing/2010/main">
+                <a:solidFill>
+                  <a:schemeClr val="accent1"/>
+                </a:solidFill>
+              </a14:hiddenFill>
+            </a:ext>
+            <a:ext uri="{91240B29-F687-4F45-9708-019B960494DF}">
+              <a14:hiddenLine xmlns:a14="http://schemas.microsoft.com/office/drawing/2010/main" w="9525">
+                <a:solidFill>
+                  <a:schemeClr val="tx1"/>
+                </a:solidFill>
+                <a:miter lim="800000"/>
+                <a:headEnd/>
+                <a:tailEnd/>
+              </a14:hiddenLine>
+            </a:ext>
+          </a:extLst>
+        </p:spPr>
+      </p:pic>
+      <p:sp>
+        <p:nvSpPr>
+          <p:cNvPr id="6" name="Rektangel med rundade hörn 5"/>
+          <p:cNvSpPr/>
+          <p:nvPr/>
+        </p:nvSpPr>
+        <p:spPr>
+          <a:xfrm>
+            <a:off x="4716016" y="2492896"/>
+            <a:ext cx="2151162" cy="504056"/>
+          </a:xfrm>
+          <a:prstGeom prst="roundRect">
+            <a:avLst/>
+          </a:prstGeom>
+          <a:solidFill>
+            <a:schemeClr val="accent5">
+              <a:lumMod val="60000"/>
+              <a:lumOff val="40000"/>
+              <a:alpha val="44000"/>
+            </a:schemeClr>
+          </a:solidFill>
+          <a:ln>
+            <a:solidFill>
+              <a:srgbClr val="FF0000"/>
+            </a:solidFill>
+          </a:ln>
+        </p:spPr>
+        <p:style>
+          <a:lnRef idx="2">
+            <a:schemeClr val="accent1">
+              <a:shade val="50000"/>
+            </a:schemeClr>
+          </a:lnRef>
+          <a:fillRef idx="1">
+            <a:schemeClr val="accent1"/>
+          </a:fillRef>
+          <a:effectRef idx="0">
+            <a:schemeClr val="accent1"/>
+          </a:effectRef>
+          <a:fontRef idx="minor">
+            <a:schemeClr val="lt1"/>
+          </a:fontRef>
+        </p:style>
+        <p:txBody>
+          <a:bodyPr rtlCol="0" anchor="ctr"/>
+          <a:lstStyle/>
+          <a:p>
+            <a:pPr algn="ctr"/>
+            <a:endParaRPr lang="sv-SE"/>
+          </a:p>
+        </p:txBody>
+      </p:sp>
+      <p:pic>
+        <p:nvPicPr>
+          <p:cNvPr id="1027" name="Picture 3"/>
+          <p:cNvPicPr>
+            <a:picLocks noChangeAspect="1" noChangeArrowheads="1"/>
+          </p:cNvPicPr>
+          <p:nvPr/>
+        </p:nvPicPr>
+        <p:blipFill>
+          <a:blip r:embed="rId4" cstate="print">
+            <a:extLst>
+              <a:ext uri="{28A0092B-C50C-407E-A947-70E740481C1C}">
+                <a14:useLocalDpi xmlns:a14="http://schemas.microsoft.com/office/drawing/2010/main" val="0"/>
+              </a:ext>
+            </a:extLst>
+          </a:blip>
+          <a:srcRect/>
+          <a:stretch>
+            <a:fillRect/>
+          </a:stretch>
+        </p:blipFill>
+        <p:spPr bwMode="auto">
+          <a:xfrm>
+            <a:off x="4499992" y="3573016"/>
+            <a:ext cx="4104456" cy="2293487"/>
+          </a:xfrm>
+          <a:prstGeom prst="rect">
+            <a:avLst/>
+          </a:prstGeom>
+          <a:noFill/>
+          <a:ln>
+            <a:noFill/>
+          </a:ln>
+          <a:extLst>
+            <a:ext uri="{909E8E84-426E-40DD-AFC4-6F175D3DCCD1}">
+              <a14:hiddenFill xmlns:a14="http://schemas.microsoft.com/office/drawing/2010/main">
+                <a:solidFill>
+                  <a:schemeClr val="accent1"/>
+                </a:solidFill>
+              </a14:hiddenFill>
+            </a:ext>
+            <a:ext uri="{91240B29-F687-4F45-9708-019B960494DF}">
+              <a14:hiddenLine xmlns:a14="http://schemas.microsoft.com/office/drawing/2010/main" w="9525">
+                <a:solidFill>
+                  <a:schemeClr val="tx1"/>
+                </a:solidFill>
+                <a:miter lim="800000"/>
+                <a:headEnd/>
+                <a:tailEnd/>
+              </a14:hiddenLine>
+            </a:ext>
+          </a:extLst>
+        </p:spPr>
+      </p:pic>
+    </p:spTree>
+    <p:extLst>
+      <p:ext uri="{BB962C8B-B14F-4D97-AF65-F5344CB8AC3E}">
+        <p14:creationId xmlns:p14="http://schemas.microsoft.com/office/powerpoint/2010/main" val="3025900096"/>
+      </p:ext>
+    </p:extLst>
+  </p:cSld>
+  <p:clrMapOvr>
+    <a:masterClrMapping/>
+  </p:clrMapOvr>
+  <p:transition spd="slow">
+    <p:push dir="u"/>
+  </p:transition>
+</p:sld>
+</file>
+
+<file path=ppt/slides/slide15.xml><?xml version="1.0" encoding="utf-8"?>
+<p:sld xmlns:a="http://schemas.openxmlformats.org/drawingml/2006/main" xmlns:r="http://schemas.openxmlformats.org/officeDocument/2006/relationships" xmlns:p="http://schemas.openxmlformats.org/presentationml/2006/main">
+  <p:cSld>
+    <p:spTree>
+      <p:nvGrpSpPr>
+        <p:cNvPr id="1" name=""/>
+        <p:cNvGrpSpPr/>
+        <p:nvPr/>
+      </p:nvGrpSpPr>
+      <p:grpSpPr>
+        <a:xfrm>
+          <a:off x="0" y="0"/>
+          <a:ext cx="0" cy="0"/>
+          <a:chOff x="0" y="0"/>
+          <a:chExt cx="0" cy="0"/>
+        </a:xfrm>
+      </p:grpSpPr>
+      <p:sp>
+        <p:nvSpPr>
+          <p:cNvPr id="2" name="Rubrik 1"/>
+          <p:cNvSpPr>
+            <a:spLocks noGrp="1"/>
+          </p:cNvSpPr>
+          <p:nvPr>
+            <p:ph type="title"/>
+          </p:nvPr>
+        </p:nvSpPr>
+        <p:spPr/>
+        <p:txBody>
           <a:bodyPr>
             <a:normAutofit/>
           </a:bodyPr>
@@ -9500,7 +9594,7 @@
             <a:fld id="{11DA82ED-F820-4319-BD97-F25880B325A1}" type="slidenum">
               <a:rPr lang="en-US" smtClean="0"/>
               <a:pPr/>
-              <a:t>14</a:t>
+              <a:t>15</a:t>
             </a:fld>
             <a:endParaRPr lang="en-US"/>
           </a:p>
@@ -9789,7 +9883,7 @@
 </p:sld>
 </file>
 
-<file path=ppt/slides/slide15.xml><?xml version="1.0" encoding="utf-8"?>
+<file path=ppt/slides/slide16.xml><?xml version="1.0" encoding="utf-8"?>
 <p:sld xmlns:a="http://schemas.openxmlformats.org/drawingml/2006/main" xmlns:r="http://schemas.openxmlformats.org/officeDocument/2006/relationships" xmlns:p="http://schemas.openxmlformats.org/presentationml/2006/main">
   <p:cSld>
     <p:spTree>
@@ -9966,7 +10060,7 @@
             <a:fld id="{11DA82ED-F820-4319-BD97-F25880B325A1}" type="slidenum">
               <a:rPr lang="en-US" smtClean="0"/>
               <a:pPr/>
-              <a:t>15</a:t>
+              <a:t>16</a:t>
             </a:fld>
             <a:endParaRPr lang="en-US"/>
           </a:p>
@@ -10266,7 +10360,7 @@
 </p:sld>
 </file>
 
-<file path=ppt/slides/slide16.xml><?xml version="1.0" encoding="utf-8"?>
+<file path=ppt/slides/slide17.xml><?xml version="1.0" encoding="utf-8"?>
 <p:sld xmlns:a="http://schemas.openxmlformats.org/drawingml/2006/main" xmlns:r="http://schemas.openxmlformats.org/officeDocument/2006/relationships" xmlns:p="http://schemas.openxmlformats.org/presentationml/2006/main">
   <p:cSld>
     <p:spTree>
@@ -10495,7 +10589,7 @@
             <a:fld id="{11DA82ED-F820-4319-BD97-F25880B325A1}" type="slidenum">
               <a:rPr lang="en-US" smtClean="0"/>
               <a:pPr/>
-              <a:t>16</a:t>
+              <a:t>17</a:t>
             </a:fld>
             <a:endParaRPr lang="en-US"/>
           </a:p>
@@ -10691,7 +10785,7 @@
 </p:sld>
 </file>
 
-<file path=ppt/slides/slide17.xml><?xml version="1.0" encoding="utf-8"?>
+<file path=ppt/slides/slide18.xml><?xml version="1.0" encoding="utf-8"?>
 <p:sld xmlns:a="http://schemas.openxmlformats.org/drawingml/2006/main" xmlns:r="http://schemas.openxmlformats.org/officeDocument/2006/relationships" xmlns:p="http://schemas.openxmlformats.org/presentationml/2006/main">
   <p:cSld>
     <p:spTree>
@@ -11154,7 +11248,7 @@
 </p:sld>
 </file>
 
-<file path=ppt/slides/slide18.xml><?xml version="1.0" encoding="utf-8"?>
+<file path=ppt/slides/slide19.xml><?xml version="1.0" encoding="utf-8"?>
 <p:sld xmlns:a="http://schemas.openxmlformats.org/drawingml/2006/main" xmlns:r="http://schemas.openxmlformats.org/officeDocument/2006/relationships" xmlns:p="http://schemas.openxmlformats.org/presentationml/2006/main">
   <p:cSld>
     <p:spTree>
@@ -11232,7 +11326,7 @@
             <a:fld id="{11DA82ED-F820-4319-BD97-F25880B325A1}" type="slidenum">
               <a:rPr lang="en-US" smtClean="0"/>
               <a:pPr/>
-              <a:t>18</a:t>
+              <a:t>19</a:t>
             </a:fld>
             <a:endParaRPr lang="en-US"/>
           </a:p>
@@ -11257,660 +11351,6 @@
         <p:cTn id="1" dur="indefinite" restart="never" nodeType="tmRoot"/>
       </p:par>
     </p:tnLst>
-  </p:timing>
-</p:sld>
-</file>
-
-<file path=ppt/slides/slide19.xml><?xml version="1.0" encoding="utf-8"?>
-<p:sld xmlns:a="http://schemas.openxmlformats.org/drawingml/2006/main" xmlns:r="http://schemas.openxmlformats.org/officeDocument/2006/relationships" xmlns:p="http://schemas.openxmlformats.org/presentationml/2006/main">
-  <p:cSld>
-    <p:spTree>
-      <p:nvGrpSpPr>
-        <p:cNvPr id="1" name=""/>
-        <p:cNvGrpSpPr/>
-        <p:nvPr/>
-      </p:nvGrpSpPr>
-      <p:grpSpPr>
-        <a:xfrm>
-          <a:off x="0" y="0"/>
-          <a:ext cx="0" cy="0"/>
-          <a:chOff x="0" y="0"/>
-          <a:chExt cx="0" cy="0"/>
-        </a:xfrm>
-      </p:grpSpPr>
-      <p:sp>
-        <p:nvSpPr>
-          <p:cNvPr id="2" name="Title 1"/>
-          <p:cNvSpPr>
-            <a:spLocks noGrp="1"/>
-          </p:cNvSpPr>
-          <p:nvPr>
-            <p:ph type="title"/>
-          </p:nvPr>
-        </p:nvSpPr>
-        <p:spPr/>
-        <p:txBody>
-          <a:bodyPr>
-            <a:normAutofit/>
-          </a:bodyPr>
-          <a:lstStyle/>
-          <a:p>
-            <a:r>
-              <a:rPr lang="en-US" sz="1800" dirty="0" smtClean="0"/>
-              <a:t>GIT GUI clients</a:t>
-            </a:r>
-            <a:endParaRPr lang="en-US" sz="1800" dirty="0"/>
-          </a:p>
-        </p:txBody>
-      </p:sp>
-      <p:sp>
-        <p:nvSpPr>
-          <p:cNvPr id="3" name="Content Placeholder 2"/>
-          <p:cNvSpPr>
-            <a:spLocks noGrp="1"/>
-          </p:cNvSpPr>
-          <p:nvPr>
-            <p:ph sz="half" idx="1"/>
-          </p:nvPr>
-        </p:nvSpPr>
-        <p:spPr>
-          <a:xfrm>
-            <a:off x="395288" y="1341438"/>
-            <a:ext cx="3888000" cy="5039889"/>
-          </a:xfrm>
-        </p:spPr>
-        <p:txBody>
-          <a:bodyPr>
-            <a:normAutofit/>
-          </a:bodyPr>
-          <a:lstStyle/>
-          <a:p>
-            <a:r>
-              <a:rPr lang="en-US" sz="3200" b="1" dirty="0" err="1" smtClean="0"/>
-              <a:t>GIThub</a:t>
-            </a:r>
-            <a:r>
-              <a:rPr lang="en-US" sz="3200" b="1" dirty="0" smtClean="0"/>
-              <a:t> for MAC </a:t>
-            </a:r>
-          </a:p>
-          <a:p>
-            <a:r>
-              <a:rPr lang="en-US" sz="3200" b="1" dirty="0" smtClean="0"/>
-              <a:t>Tower </a:t>
-            </a:r>
-          </a:p>
-          <a:p>
-            <a:r>
-              <a:rPr lang="en-US" sz="3200" b="1" dirty="0" err="1" smtClean="0"/>
-              <a:t>GITbox</a:t>
-            </a:r>
-            <a:endParaRPr lang="en-US" sz="3200" b="1" dirty="0"/>
-          </a:p>
-          <a:p>
-            <a:r>
-              <a:rPr lang="en-US" sz="3200" b="1" dirty="0" err="1" smtClean="0"/>
-              <a:t>Atlassian</a:t>
-            </a:r>
-            <a:r>
-              <a:rPr lang="en-US" sz="3200" b="1" dirty="0" smtClean="0"/>
-              <a:t> </a:t>
-            </a:r>
-            <a:r>
-              <a:rPr lang="en-US" sz="3200" b="1" dirty="0" err="1" smtClean="0"/>
-              <a:t>Sourcetree</a:t>
-            </a:r>
-            <a:r>
-              <a:rPr lang="en-US" sz="3200" b="1" dirty="0" smtClean="0"/>
-              <a:t>	</a:t>
-            </a:r>
-          </a:p>
-          <a:p>
-            <a:r>
-              <a:rPr lang="en-US" sz="3200" b="1" dirty="0" err="1" smtClean="0"/>
-              <a:t>Git</a:t>
-            </a:r>
-            <a:r>
-              <a:rPr lang="en-US" sz="3200" b="1" dirty="0" smtClean="0"/>
-              <a:t> cola </a:t>
-            </a:r>
-          </a:p>
-          <a:p>
-            <a:r>
-              <a:rPr lang="en-US" sz="3200" b="1" dirty="0" err="1" smtClean="0"/>
-              <a:t>Gitg</a:t>
-            </a:r>
-            <a:endParaRPr lang="en-US" sz="3200" b="1" dirty="0"/>
-          </a:p>
-        </p:txBody>
-      </p:sp>
-      <p:sp>
-        <p:nvSpPr>
-          <p:cNvPr id="4" name="Content Placeholder 3"/>
-          <p:cNvSpPr>
-            <a:spLocks noGrp="1"/>
-          </p:cNvSpPr>
-          <p:nvPr>
-            <p:ph sz="half" idx="2"/>
-          </p:nvPr>
-        </p:nvSpPr>
-        <p:spPr/>
-        <p:txBody>
-          <a:bodyPr/>
-          <a:lstStyle/>
-          <a:p>
-            <a:r>
-              <a:rPr lang="en-US" sz="1800" dirty="0" smtClean="0"/>
-              <a:t>Find and use the one you are most comfortable with</a:t>
-            </a:r>
-          </a:p>
-          <a:p>
-            <a:r>
-              <a:rPr lang="sv-SE" sz="1800" dirty="0" err="1" smtClean="0"/>
-              <a:t>Download</a:t>
-            </a:r>
-            <a:r>
-              <a:rPr lang="sv-SE" sz="1800" dirty="0" smtClean="0"/>
-              <a:t> </a:t>
-            </a:r>
-            <a:r>
-              <a:rPr lang="sv-SE" sz="1800" dirty="0" err="1" smtClean="0"/>
-              <a:t>link</a:t>
-            </a:r>
-            <a:r>
-              <a:rPr lang="sv-SE" sz="1800" dirty="0" smtClean="0"/>
-              <a:t>: </a:t>
-            </a:r>
-            <a:br>
-              <a:rPr lang="sv-SE" sz="1800" dirty="0" smtClean="0"/>
-            </a:br>
-            <a:r>
-              <a:rPr lang="pl-PL" dirty="0" smtClean="0">
-                <a:hlinkClick r:id="rId2"/>
-              </a:rPr>
-              <a:t>http:/</a:t>
-            </a:r>
-            <a:r>
-              <a:rPr lang="pl-PL" dirty="0">
-                <a:hlinkClick r:id="rId2"/>
-              </a:rPr>
-              <a:t>/git-scm.com/download/gui/</a:t>
-            </a:r>
-            <a:r>
-              <a:rPr lang="pl-PL" dirty="0" smtClean="0">
-                <a:hlinkClick r:id="rId2"/>
-              </a:rPr>
-              <a:t>linux</a:t>
-            </a:r>
-            <a:endParaRPr lang="pl-PL" dirty="0" smtClean="0"/>
-          </a:p>
-          <a:p>
-            <a:endParaRPr lang="en-US" dirty="0" smtClean="0"/>
-          </a:p>
-        </p:txBody>
-      </p:sp>
-      <p:sp>
-        <p:nvSpPr>
-          <p:cNvPr id="5" name="Slide Number Placeholder 4"/>
-          <p:cNvSpPr>
-            <a:spLocks noGrp="1"/>
-          </p:cNvSpPr>
-          <p:nvPr>
-            <p:ph type="sldNum" sz="quarter" idx="12"/>
-          </p:nvPr>
-        </p:nvSpPr>
-        <p:spPr/>
-        <p:txBody>
-          <a:bodyPr/>
-          <a:lstStyle/>
-          <a:p>
-            <a:fld id="{11DA82ED-F820-4319-BD97-F25880B325A1}" type="slidenum">
-              <a:rPr lang="en-US" smtClean="0"/>
-              <a:pPr/>
-              <a:t>19</a:t>
-            </a:fld>
-            <a:endParaRPr lang="en-US"/>
-          </a:p>
-        </p:txBody>
-      </p:sp>
-    </p:spTree>
-    <p:extLst>
-      <p:ext uri="{BB962C8B-B14F-4D97-AF65-F5344CB8AC3E}">
-        <p14:creationId xmlns:p14="http://schemas.microsoft.com/office/powerpoint/2010/main" val="1745436384"/>
-      </p:ext>
-    </p:extLst>
-  </p:cSld>
-  <p:clrMapOvr>
-    <a:masterClrMapping/>
-  </p:clrMapOvr>
-  <p:transition spd="slow">
-    <p:push dir="u"/>
-  </p:transition>
-  <p:timing>
-    <p:tnLst>
-      <p:par>
-        <p:cTn id="1" dur="indefinite" restart="never" nodeType="tmRoot">
-          <p:childTnLst>
-            <p:seq concurrent="1" nextAc="seek">
-              <p:cTn id="2" dur="indefinite" nodeType="mainSeq">
-                <p:childTnLst>
-                  <p:par>
-                    <p:cTn id="3" fill="hold">
-                      <p:stCondLst>
-                        <p:cond delay="indefinite"/>
-                      </p:stCondLst>
-                      <p:childTnLst>
-                        <p:par>
-                          <p:cTn id="4" fill="hold">
-                            <p:stCondLst>
-                              <p:cond delay="0"/>
-                            </p:stCondLst>
-                            <p:childTnLst>
-                              <p:par>
-                                <p:cTn id="5" presetID="1" presetClass="entr" presetSubtype="0" fill="hold" grpId="0" nodeType="clickEffect">
-                                  <p:stCondLst>
-                                    <p:cond delay="0"/>
-                                  </p:stCondLst>
-                                  <p:childTnLst>
-                                    <p:set>
-                                      <p:cBhvr>
-                                        <p:cTn id="6" dur="1" fill="hold">
-                                          <p:stCondLst>
-                                            <p:cond delay="0"/>
-                                          </p:stCondLst>
-                                        </p:cTn>
-                                        <p:tgtEl>
-                                          <p:spTgt spid="3">
-                                            <p:txEl>
-                                              <p:pRg st="0" end="0"/>
-                                            </p:txEl>
-                                          </p:spTgt>
-                                        </p:tgtEl>
-                                        <p:attrNameLst>
-                                          <p:attrName>style.visibility</p:attrName>
-                                        </p:attrNameLst>
-                                      </p:cBhvr>
-                                      <p:to>
-                                        <p:strVal val="visible"/>
-                                      </p:to>
-                                    </p:set>
-                                  </p:childTnLst>
-                                </p:cTn>
-                              </p:par>
-                            </p:childTnLst>
-                          </p:cTn>
-                        </p:par>
-                      </p:childTnLst>
-                    </p:cTn>
-                  </p:par>
-                  <p:par>
-                    <p:cTn id="7" fill="hold">
-                      <p:stCondLst>
-                        <p:cond delay="indefinite"/>
-                      </p:stCondLst>
-                      <p:childTnLst>
-                        <p:par>
-                          <p:cTn id="8" fill="hold">
-                            <p:stCondLst>
-                              <p:cond delay="0"/>
-                            </p:stCondLst>
-                            <p:childTnLst>
-                              <p:par>
-                                <p:cTn id="9" presetID="1" presetClass="entr" presetSubtype="0" fill="hold" grpId="0" nodeType="clickEffect">
-                                  <p:stCondLst>
-                                    <p:cond delay="0"/>
-                                  </p:stCondLst>
-                                  <p:childTnLst>
-                                    <p:set>
-                                      <p:cBhvr>
-                                        <p:cTn id="10" dur="1" fill="hold">
-                                          <p:stCondLst>
-                                            <p:cond delay="0"/>
-                                          </p:stCondLst>
-                                        </p:cTn>
-                                        <p:tgtEl>
-                                          <p:spTgt spid="3">
-                                            <p:txEl>
-                                              <p:pRg st="1" end="1"/>
-                                            </p:txEl>
-                                          </p:spTgt>
-                                        </p:tgtEl>
-                                        <p:attrNameLst>
-                                          <p:attrName>style.visibility</p:attrName>
-                                        </p:attrNameLst>
-                                      </p:cBhvr>
-                                      <p:to>
-                                        <p:strVal val="visible"/>
-                                      </p:to>
-                                    </p:set>
-                                  </p:childTnLst>
-                                </p:cTn>
-                              </p:par>
-                            </p:childTnLst>
-                          </p:cTn>
-                        </p:par>
-                      </p:childTnLst>
-                    </p:cTn>
-                  </p:par>
-                  <p:par>
-                    <p:cTn id="11" fill="hold">
-                      <p:stCondLst>
-                        <p:cond delay="indefinite"/>
-                      </p:stCondLst>
-                      <p:childTnLst>
-                        <p:par>
-                          <p:cTn id="12" fill="hold">
-                            <p:stCondLst>
-                              <p:cond delay="0"/>
-                            </p:stCondLst>
-                            <p:childTnLst>
-                              <p:par>
-                                <p:cTn id="13" presetID="1" presetClass="entr" presetSubtype="0" fill="hold" grpId="0" nodeType="clickEffect">
-                                  <p:stCondLst>
-                                    <p:cond delay="0"/>
-                                  </p:stCondLst>
-                                  <p:childTnLst>
-                                    <p:set>
-                                      <p:cBhvr>
-                                        <p:cTn id="14" dur="1" fill="hold">
-                                          <p:stCondLst>
-                                            <p:cond delay="0"/>
-                                          </p:stCondLst>
-                                        </p:cTn>
-                                        <p:tgtEl>
-                                          <p:spTgt spid="3">
-                                            <p:txEl>
-                                              <p:pRg st="2" end="2"/>
-                                            </p:txEl>
-                                          </p:spTgt>
-                                        </p:tgtEl>
-                                        <p:attrNameLst>
-                                          <p:attrName>style.visibility</p:attrName>
-                                        </p:attrNameLst>
-                                      </p:cBhvr>
-                                      <p:to>
-                                        <p:strVal val="visible"/>
-                                      </p:to>
-                                    </p:set>
-                                  </p:childTnLst>
-                                </p:cTn>
-                              </p:par>
-                            </p:childTnLst>
-                          </p:cTn>
-                        </p:par>
-                      </p:childTnLst>
-                    </p:cTn>
-                  </p:par>
-                  <p:par>
-                    <p:cTn id="15" fill="hold">
-                      <p:stCondLst>
-                        <p:cond delay="indefinite"/>
-                      </p:stCondLst>
-                      <p:childTnLst>
-                        <p:par>
-                          <p:cTn id="16" fill="hold">
-                            <p:stCondLst>
-                              <p:cond delay="0"/>
-                            </p:stCondLst>
-                            <p:childTnLst>
-                              <p:par>
-                                <p:cTn id="17" presetID="1" presetClass="entr" presetSubtype="0" fill="hold" grpId="0" nodeType="clickEffect">
-                                  <p:stCondLst>
-                                    <p:cond delay="0"/>
-                                  </p:stCondLst>
-                                  <p:childTnLst>
-                                    <p:set>
-                                      <p:cBhvr>
-                                        <p:cTn id="18" dur="1" fill="hold">
-                                          <p:stCondLst>
-                                            <p:cond delay="0"/>
-                                          </p:stCondLst>
-                                        </p:cTn>
-                                        <p:tgtEl>
-                                          <p:spTgt spid="3">
-                                            <p:txEl>
-                                              <p:pRg st="3" end="3"/>
-                                            </p:txEl>
-                                          </p:spTgt>
-                                        </p:tgtEl>
-                                        <p:attrNameLst>
-                                          <p:attrName>style.visibility</p:attrName>
-                                        </p:attrNameLst>
-                                      </p:cBhvr>
-                                      <p:to>
-                                        <p:strVal val="visible"/>
-                                      </p:to>
-                                    </p:set>
-                                  </p:childTnLst>
-                                </p:cTn>
-                              </p:par>
-                            </p:childTnLst>
-                          </p:cTn>
-                        </p:par>
-                      </p:childTnLst>
-                    </p:cTn>
-                  </p:par>
-                  <p:par>
-                    <p:cTn id="19" fill="hold">
-                      <p:stCondLst>
-                        <p:cond delay="indefinite"/>
-                      </p:stCondLst>
-                      <p:childTnLst>
-                        <p:par>
-                          <p:cTn id="20" fill="hold">
-                            <p:stCondLst>
-                              <p:cond delay="0"/>
-                            </p:stCondLst>
-                            <p:childTnLst>
-                              <p:par>
-                                <p:cTn id="21" presetID="1" presetClass="entr" presetSubtype="0" fill="hold" grpId="0" nodeType="clickEffect">
-                                  <p:stCondLst>
-                                    <p:cond delay="0"/>
-                                  </p:stCondLst>
-                                  <p:childTnLst>
-                                    <p:set>
-                                      <p:cBhvr>
-                                        <p:cTn id="22" dur="1" fill="hold">
-                                          <p:stCondLst>
-                                            <p:cond delay="0"/>
-                                          </p:stCondLst>
-                                        </p:cTn>
-                                        <p:tgtEl>
-                                          <p:spTgt spid="3">
-                                            <p:txEl>
-                                              <p:pRg st="4" end="4"/>
-                                            </p:txEl>
-                                          </p:spTgt>
-                                        </p:tgtEl>
-                                        <p:attrNameLst>
-                                          <p:attrName>style.visibility</p:attrName>
-                                        </p:attrNameLst>
-                                      </p:cBhvr>
-                                      <p:to>
-                                        <p:strVal val="visible"/>
-                                      </p:to>
-                                    </p:set>
-                                  </p:childTnLst>
-                                </p:cTn>
-                              </p:par>
-                            </p:childTnLst>
-                          </p:cTn>
-                        </p:par>
-                      </p:childTnLst>
-                    </p:cTn>
-                  </p:par>
-                  <p:par>
-                    <p:cTn id="23" fill="hold">
-                      <p:stCondLst>
-                        <p:cond delay="indefinite"/>
-                      </p:stCondLst>
-                      <p:childTnLst>
-                        <p:par>
-                          <p:cTn id="24" fill="hold">
-                            <p:stCondLst>
-                              <p:cond delay="0"/>
-                            </p:stCondLst>
-                            <p:childTnLst>
-                              <p:par>
-                                <p:cTn id="25" presetID="1" presetClass="entr" presetSubtype="0" fill="hold" grpId="0" nodeType="clickEffect">
-                                  <p:stCondLst>
-                                    <p:cond delay="0"/>
-                                  </p:stCondLst>
-                                  <p:childTnLst>
-                                    <p:set>
-                                      <p:cBhvr>
-                                        <p:cTn id="26" dur="1" fill="hold">
-                                          <p:stCondLst>
-                                            <p:cond delay="0"/>
-                                          </p:stCondLst>
-                                        </p:cTn>
-                                        <p:tgtEl>
-                                          <p:spTgt spid="3">
-                                            <p:txEl>
-                                              <p:pRg st="5" end="5"/>
-                                            </p:txEl>
-                                          </p:spTgt>
-                                        </p:tgtEl>
-                                        <p:attrNameLst>
-                                          <p:attrName>style.visibility</p:attrName>
-                                        </p:attrNameLst>
-                                      </p:cBhvr>
-                                      <p:to>
-                                        <p:strVal val="visible"/>
-                                      </p:to>
-                                    </p:set>
-                                  </p:childTnLst>
-                                </p:cTn>
-                              </p:par>
-                            </p:childTnLst>
-                          </p:cTn>
-                        </p:par>
-                      </p:childTnLst>
-                    </p:cTn>
-                  </p:par>
-                  <p:par>
-                    <p:cTn id="27" fill="hold">
-                      <p:stCondLst>
-                        <p:cond delay="indefinite"/>
-                      </p:stCondLst>
-                      <p:childTnLst>
-                        <p:par>
-                          <p:cTn id="28" fill="hold">
-                            <p:stCondLst>
-                              <p:cond delay="0"/>
-                            </p:stCondLst>
-                            <p:childTnLst>
-                              <p:par>
-                                <p:cTn id="29" presetID="1" presetClass="entr" presetSubtype="0" fill="hold" grpId="0" nodeType="clickEffect">
-                                  <p:stCondLst>
-                                    <p:cond delay="0"/>
-                                  </p:stCondLst>
-                                  <p:childTnLst>
-                                    <p:set>
-                                      <p:cBhvr>
-                                        <p:cTn id="30" dur="1" fill="hold">
-                                          <p:stCondLst>
-                                            <p:cond delay="0"/>
-                                          </p:stCondLst>
-                                        </p:cTn>
-                                        <p:tgtEl>
-                                          <p:spTgt spid="4">
-                                            <p:txEl>
-                                              <p:pRg st="0" end="0"/>
-                                            </p:txEl>
-                                          </p:spTgt>
-                                        </p:tgtEl>
-                                        <p:attrNameLst>
-                                          <p:attrName>style.visibility</p:attrName>
-                                        </p:attrNameLst>
-                                      </p:cBhvr>
-                                      <p:to>
-                                        <p:strVal val="visible"/>
-                                      </p:to>
-                                    </p:set>
-                                  </p:childTnLst>
-                                </p:cTn>
-                              </p:par>
-                            </p:childTnLst>
-                          </p:cTn>
-                        </p:par>
-                      </p:childTnLst>
-                    </p:cTn>
-                  </p:par>
-                  <p:par>
-                    <p:cTn id="31" fill="hold">
-                      <p:stCondLst>
-                        <p:cond delay="indefinite"/>
-                      </p:stCondLst>
-                      <p:childTnLst>
-                        <p:par>
-                          <p:cTn id="32" fill="hold">
-                            <p:stCondLst>
-                              <p:cond delay="0"/>
-                            </p:stCondLst>
-                            <p:childTnLst>
-                              <p:par>
-                                <p:cTn id="33" presetID="1" presetClass="entr" presetSubtype="0" fill="hold" grpId="0" nodeType="clickEffect">
-                                  <p:stCondLst>
-                                    <p:cond delay="0"/>
-                                  </p:stCondLst>
-                                  <p:childTnLst>
-                                    <p:set>
-                                      <p:cBhvr>
-                                        <p:cTn id="34" dur="1" fill="hold">
-                                          <p:stCondLst>
-                                            <p:cond delay="0"/>
-                                          </p:stCondLst>
-                                        </p:cTn>
-                                        <p:tgtEl>
-                                          <p:spTgt spid="4">
-                                            <p:txEl>
-                                              <p:pRg st="1" end="1"/>
-                                            </p:txEl>
-                                          </p:spTgt>
-                                        </p:tgtEl>
-                                        <p:attrNameLst>
-                                          <p:attrName>style.visibility</p:attrName>
-                                        </p:attrNameLst>
-                                      </p:cBhvr>
-                                      <p:to>
-                                        <p:strVal val="visible"/>
-                                      </p:to>
-                                    </p:set>
-                                  </p:childTnLst>
-                                </p:cTn>
-                              </p:par>
-                            </p:childTnLst>
-                          </p:cTn>
-                        </p:par>
-                      </p:childTnLst>
-                    </p:cTn>
-                  </p:par>
-                </p:childTnLst>
-              </p:cTn>
-              <p:prevCondLst>
-                <p:cond evt="onPrev" delay="0">
-                  <p:tgtEl>
-                    <p:sldTgt/>
-                  </p:tgtEl>
-                </p:cond>
-              </p:prevCondLst>
-              <p:nextCondLst>
-                <p:cond evt="onNext" delay="0">
-                  <p:tgtEl>
-                    <p:sldTgt/>
-                  </p:tgtEl>
-                </p:cond>
-              </p:nextCondLst>
-            </p:seq>
-          </p:childTnLst>
-        </p:cTn>
-      </p:par>
-    </p:tnLst>
-    <p:bldLst>
-      <p:bldP spid="3" grpId="0" build="p"/>
-      <p:bldP spid="4" grpId="0" build="p"/>
-    </p:bldLst>
   </p:timing>
 </p:sld>
 </file>
@@ -12113,7 +11553,7 @@
           </a:prstGeom>
           <a:extLst>
             <a:ext uri="{FAA26D3D-D897-4be2-8F04-BA451C77F1D7}">
-              <ma14:placeholderFlag xmlns:lc="http://schemas.openxmlformats.org/drawingml/2006/lockedCanvas" xmlns:ve="http://schemas.openxmlformats.org/markup-compatibility/2006" xmlns:ma14="http://schemas.microsoft.com/office/mac/drawingml/2011/main" xmlns:w="http://schemas.openxmlformats.org/wordprocessingml/2006/main" xmlns:w10="urn:schemas-microsoft-com:office:word" xmlns:v="urn:schemas-microsoft-com:vml" xmlns:o="urn:schemas-microsoft-com:office:office" xmlns:mv="urn:schemas-microsoft-com:mac:vml" xmlns:mo="http://schemas.microsoft.com/office/mac/office/2008/main" xmlns="" xmlns:pic="http://schemas.openxmlformats.org/drawingml/2006/picture" xmlns:wps="http://schemas.microsoft.com/office/word/2010/wordprocessingShape" xmlns:wne="http://schemas.microsoft.com/office/word/2006/wordml" xmlns:wpi="http://schemas.microsoft.com/office/word/2010/wordprocessingInk" xmlns:wpg="http://schemas.microsoft.com/office/word/2010/wordprocessingGroup" xmlns:w14="http://schemas.microsoft.com/office/word/2010/wordml" xmlns:wp="http://schemas.openxmlformats.org/drawingml/2006/wordprocessingDrawing" xmlns:wp14="http://schemas.microsoft.com/office/word/2010/wordprocessingDrawing" xmlns:m="http://schemas.openxmlformats.org/officeDocument/2006/math" xmlns:mc="http://schemas.openxmlformats.org/markup-compatibility/2006" xmlns:wpc="http://schemas.microsoft.com/office/word/2010/wordprocessingCanvas"/>
+              <ma14:placeholderFlag xmlns:wpc="http://schemas.microsoft.com/office/word/2010/wordprocessingCanvas" xmlns:mc="http://schemas.openxmlformats.org/markup-compatibility/2006" xmlns:m="http://schemas.openxmlformats.org/officeDocument/2006/math" xmlns:wp14="http://schemas.microsoft.com/office/word/2010/wordprocessingDrawing" xmlns:wp="http://schemas.openxmlformats.org/drawingml/2006/wordprocessingDrawing" xmlns:w14="http://schemas.microsoft.com/office/word/2010/wordml" xmlns:wpg="http://schemas.microsoft.com/office/word/2010/wordprocessingGroup" xmlns:wpi="http://schemas.microsoft.com/office/word/2010/wordprocessingInk" xmlns:wne="http://schemas.microsoft.com/office/word/2006/wordml" xmlns:wps="http://schemas.microsoft.com/office/word/2010/wordprocessingShape" xmlns:pic="http://schemas.openxmlformats.org/drawingml/2006/picture" xmlns="" xmlns:mo="http://schemas.microsoft.com/office/mac/office/2008/main" xmlns:mv="urn:schemas-microsoft-com:mac:vml" xmlns:o="urn:schemas-microsoft-com:office:office" xmlns:v="urn:schemas-microsoft-com:vml" xmlns:w10="urn:schemas-microsoft-com:office:word" xmlns:w="http://schemas.openxmlformats.org/wordprocessingml/2006/main" xmlns:ma14="http://schemas.microsoft.com/office/mac/drawingml/2011/main" xmlns:ve="http://schemas.openxmlformats.org/markup-compatibility/2006" xmlns:lc="http://schemas.openxmlformats.org/drawingml/2006/lockedCanvas"/>
             </a:ext>
           </a:extLst>
         </p:spPr>
@@ -12977,6 +12417,660 @@
       </p:grpSpPr>
       <p:sp>
         <p:nvSpPr>
+          <p:cNvPr id="2" name="Title 1"/>
+          <p:cNvSpPr>
+            <a:spLocks noGrp="1"/>
+          </p:cNvSpPr>
+          <p:nvPr>
+            <p:ph type="title"/>
+          </p:nvPr>
+        </p:nvSpPr>
+        <p:spPr/>
+        <p:txBody>
+          <a:bodyPr>
+            <a:normAutofit/>
+          </a:bodyPr>
+          <a:lstStyle/>
+          <a:p>
+            <a:r>
+              <a:rPr lang="en-US" sz="1800" dirty="0" smtClean="0"/>
+              <a:t>GIT GUI clients</a:t>
+            </a:r>
+            <a:endParaRPr lang="en-US" sz="1800" dirty="0"/>
+          </a:p>
+        </p:txBody>
+      </p:sp>
+      <p:sp>
+        <p:nvSpPr>
+          <p:cNvPr id="3" name="Content Placeholder 2"/>
+          <p:cNvSpPr>
+            <a:spLocks noGrp="1"/>
+          </p:cNvSpPr>
+          <p:nvPr>
+            <p:ph sz="half" idx="1"/>
+          </p:nvPr>
+        </p:nvSpPr>
+        <p:spPr>
+          <a:xfrm>
+            <a:off x="395288" y="1341438"/>
+            <a:ext cx="3888000" cy="5039889"/>
+          </a:xfrm>
+        </p:spPr>
+        <p:txBody>
+          <a:bodyPr>
+            <a:normAutofit/>
+          </a:bodyPr>
+          <a:lstStyle/>
+          <a:p>
+            <a:r>
+              <a:rPr lang="en-US" sz="3200" b="1" dirty="0" err="1" smtClean="0"/>
+              <a:t>GIThub</a:t>
+            </a:r>
+            <a:r>
+              <a:rPr lang="en-US" sz="3200" b="1" dirty="0" smtClean="0"/>
+              <a:t> for MAC </a:t>
+            </a:r>
+          </a:p>
+          <a:p>
+            <a:r>
+              <a:rPr lang="en-US" sz="3200" b="1" dirty="0" smtClean="0"/>
+              <a:t>Tower </a:t>
+            </a:r>
+          </a:p>
+          <a:p>
+            <a:r>
+              <a:rPr lang="en-US" sz="3200" b="1" dirty="0" err="1" smtClean="0"/>
+              <a:t>GITbox</a:t>
+            </a:r>
+            <a:endParaRPr lang="en-US" sz="3200" b="1" dirty="0"/>
+          </a:p>
+          <a:p>
+            <a:r>
+              <a:rPr lang="en-US" sz="3200" b="1" dirty="0" err="1" smtClean="0"/>
+              <a:t>Atlassian</a:t>
+            </a:r>
+            <a:r>
+              <a:rPr lang="en-US" sz="3200" b="1" dirty="0" smtClean="0"/>
+              <a:t> </a:t>
+            </a:r>
+            <a:r>
+              <a:rPr lang="en-US" sz="3200" b="1" dirty="0" err="1" smtClean="0"/>
+              <a:t>Sourcetree</a:t>
+            </a:r>
+            <a:r>
+              <a:rPr lang="en-US" sz="3200" b="1" dirty="0" smtClean="0"/>
+              <a:t>	</a:t>
+            </a:r>
+          </a:p>
+          <a:p>
+            <a:r>
+              <a:rPr lang="en-US" sz="3200" b="1" dirty="0" err="1" smtClean="0"/>
+              <a:t>Git</a:t>
+            </a:r>
+            <a:r>
+              <a:rPr lang="en-US" sz="3200" b="1" dirty="0" smtClean="0"/>
+              <a:t> cola </a:t>
+            </a:r>
+          </a:p>
+          <a:p>
+            <a:r>
+              <a:rPr lang="en-US" sz="3200" b="1" dirty="0" err="1" smtClean="0"/>
+              <a:t>Gitg</a:t>
+            </a:r>
+            <a:endParaRPr lang="en-US" sz="3200" b="1" dirty="0"/>
+          </a:p>
+        </p:txBody>
+      </p:sp>
+      <p:sp>
+        <p:nvSpPr>
+          <p:cNvPr id="4" name="Content Placeholder 3"/>
+          <p:cNvSpPr>
+            <a:spLocks noGrp="1"/>
+          </p:cNvSpPr>
+          <p:nvPr>
+            <p:ph sz="half" idx="2"/>
+          </p:nvPr>
+        </p:nvSpPr>
+        <p:spPr/>
+        <p:txBody>
+          <a:bodyPr/>
+          <a:lstStyle/>
+          <a:p>
+            <a:r>
+              <a:rPr lang="en-US" sz="1800" dirty="0" smtClean="0"/>
+              <a:t>Find and use the one you are most comfortable with</a:t>
+            </a:r>
+          </a:p>
+          <a:p>
+            <a:r>
+              <a:rPr lang="sv-SE" sz="1800" dirty="0" err="1" smtClean="0"/>
+              <a:t>Download</a:t>
+            </a:r>
+            <a:r>
+              <a:rPr lang="sv-SE" sz="1800" dirty="0" smtClean="0"/>
+              <a:t> </a:t>
+            </a:r>
+            <a:r>
+              <a:rPr lang="sv-SE" sz="1800" dirty="0" err="1" smtClean="0"/>
+              <a:t>link</a:t>
+            </a:r>
+            <a:r>
+              <a:rPr lang="sv-SE" sz="1800" dirty="0" smtClean="0"/>
+              <a:t>: </a:t>
+            </a:r>
+            <a:br>
+              <a:rPr lang="sv-SE" sz="1800" dirty="0" smtClean="0"/>
+            </a:br>
+            <a:r>
+              <a:rPr lang="pl-PL" dirty="0" smtClean="0">
+                <a:hlinkClick r:id="rId2"/>
+              </a:rPr>
+              <a:t>http:/</a:t>
+            </a:r>
+            <a:r>
+              <a:rPr lang="pl-PL" dirty="0">
+                <a:hlinkClick r:id="rId2"/>
+              </a:rPr>
+              <a:t>/git-scm.com/download/gui/</a:t>
+            </a:r>
+            <a:r>
+              <a:rPr lang="pl-PL" dirty="0" smtClean="0">
+                <a:hlinkClick r:id="rId2"/>
+              </a:rPr>
+              <a:t>linux</a:t>
+            </a:r>
+            <a:endParaRPr lang="pl-PL" dirty="0" smtClean="0"/>
+          </a:p>
+          <a:p>
+            <a:endParaRPr lang="en-US" dirty="0" smtClean="0"/>
+          </a:p>
+        </p:txBody>
+      </p:sp>
+      <p:sp>
+        <p:nvSpPr>
+          <p:cNvPr id="5" name="Slide Number Placeholder 4"/>
+          <p:cNvSpPr>
+            <a:spLocks noGrp="1"/>
+          </p:cNvSpPr>
+          <p:nvPr>
+            <p:ph type="sldNum" sz="quarter" idx="12"/>
+          </p:nvPr>
+        </p:nvSpPr>
+        <p:spPr/>
+        <p:txBody>
+          <a:bodyPr/>
+          <a:lstStyle/>
+          <a:p>
+            <a:fld id="{11DA82ED-F820-4319-BD97-F25880B325A1}" type="slidenum">
+              <a:rPr lang="en-US" smtClean="0"/>
+              <a:pPr/>
+              <a:t>20</a:t>
+            </a:fld>
+            <a:endParaRPr lang="en-US"/>
+          </a:p>
+        </p:txBody>
+      </p:sp>
+    </p:spTree>
+    <p:extLst>
+      <p:ext uri="{BB962C8B-B14F-4D97-AF65-F5344CB8AC3E}">
+        <p14:creationId xmlns:p14="http://schemas.microsoft.com/office/powerpoint/2010/main" val="1745436384"/>
+      </p:ext>
+    </p:extLst>
+  </p:cSld>
+  <p:clrMapOvr>
+    <a:masterClrMapping/>
+  </p:clrMapOvr>
+  <p:transition spd="slow">
+    <p:push dir="u"/>
+  </p:transition>
+  <p:timing>
+    <p:tnLst>
+      <p:par>
+        <p:cTn id="1" dur="indefinite" restart="never" nodeType="tmRoot">
+          <p:childTnLst>
+            <p:seq concurrent="1" nextAc="seek">
+              <p:cTn id="2" dur="indefinite" nodeType="mainSeq">
+                <p:childTnLst>
+                  <p:par>
+                    <p:cTn id="3" fill="hold">
+                      <p:stCondLst>
+                        <p:cond delay="indefinite"/>
+                      </p:stCondLst>
+                      <p:childTnLst>
+                        <p:par>
+                          <p:cTn id="4" fill="hold">
+                            <p:stCondLst>
+                              <p:cond delay="0"/>
+                            </p:stCondLst>
+                            <p:childTnLst>
+                              <p:par>
+                                <p:cTn id="5" presetID="1" presetClass="entr" presetSubtype="0" fill="hold" grpId="0" nodeType="clickEffect">
+                                  <p:stCondLst>
+                                    <p:cond delay="0"/>
+                                  </p:stCondLst>
+                                  <p:childTnLst>
+                                    <p:set>
+                                      <p:cBhvr>
+                                        <p:cTn id="6" dur="1" fill="hold">
+                                          <p:stCondLst>
+                                            <p:cond delay="0"/>
+                                          </p:stCondLst>
+                                        </p:cTn>
+                                        <p:tgtEl>
+                                          <p:spTgt spid="3">
+                                            <p:txEl>
+                                              <p:pRg st="0" end="0"/>
+                                            </p:txEl>
+                                          </p:spTgt>
+                                        </p:tgtEl>
+                                        <p:attrNameLst>
+                                          <p:attrName>style.visibility</p:attrName>
+                                        </p:attrNameLst>
+                                      </p:cBhvr>
+                                      <p:to>
+                                        <p:strVal val="visible"/>
+                                      </p:to>
+                                    </p:set>
+                                  </p:childTnLst>
+                                </p:cTn>
+                              </p:par>
+                            </p:childTnLst>
+                          </p:cTn>
+                        </p:par>
+                      </p:childTnLst>
+                    </p:cTn>
+                  </p:par>
+                  <p:par>
+                    <p:cTn id="7" fill="hold">
+                      <p:stCondLst>
+                        <p:cond delay="indefinite"/>
+                      </p:stCondLst>
+                      <p:childTnLst>
+                        <p:par>
+                          <p:cTn id="8" fill="hold">
+                            <p:stCondLst>
+                              <p:cond delay="0"/>
+                            </p:stCondLst>
+                            <p:childTnLst>
+                              <p:par>
+                                <p:cTn id="9" presetID="1" presetClass="entr" presetSubtype="0" fill="hold" grpId="0" nodeType="clickEffect">
+                                  <p:stCondLst>
+                                    <p:cond delay="0"/>
+                                  </p:stCondLst>
+                                  <p:childTnLst>
+                                    <p:set>
+                                      <p:cBhvr>
+                                        <p:cTn id="10" dur="1" fill="hold">
+                                          <p:stCondLst>
+                                            <p:cond delay="0"/>
+                                          </p:stCondLst>
+                                        </p:cTn>
+                                        <p:tgtEl>
+                                          <p:spTgt spid="3">
+                                            <p:txEl>
+                                              <p:pRg st="1" end="1"/>
+                                            </p:txEl>
+                                          </p:spTgt>
+                                        </p:tgtEl>
+                                        <p:attrNameLst>
+                                          <p:attrName>style.visibility</p:attrName>
+                                        </p:attrNameLst>
+                                      </p:cBhvr>
+                                      <p:to>
+                                        <p:strVal val="visible"/>
+                                      </p:to>
+                                    </p:set>
+                                  </p:childTnLst>
+                                </p:cTn>
+                              </p:par>
+                            </p:childTnLst>
+                          </p:cTn>
+                        </p:par>
+                      </p:childTnLst>
+                    </p:cTn>
+                  </p:par>
+                  <p:par>
+                    <p:cTn id="11" fill="hold">
+                      <p:stCondLst>
+                        <p:cond delay="indefinite"/>
+                      </p:stCondLst>
+                      <p:childTnLst>
+                        <p:par>
+                          <p:cTn id="12" fill="hold">
+                            <p:stCondLst>
+                              <p:cond delay="0"/>
+                            </p:stCondLst>
+                            <p:childTnLst>
+                              <p:par>
+                                <p:cTn id="13" presetID="1" presetClass="entr" presetSubtype="0" fill="hold" grpId="0" nodeType="clickEffect">
+                                  <p:stCondLst>
+                                    <p:cond delay="0"/>
+                                  </p:stCondLst>
+                                  <p:childTnLst>
+                                    <p:set>
+                                      <p:cBhvr>
+                                        <p:cTn id="14" dur="1" fill="hold">
+                                          <p:stCondLst>
+                                            <p:cond delay="0"/>
+                                          </p:stCondLst>
+                                        </p:cTn>
+                                        <p:tgtEl>
+                                          <p:spTgt spid="3">
+                                            <p:txEl>
+                                              <p:pRg st="2" end="2"/>
+                                            </p:txEl>
+                                          </p:spTgt>
+                                        </p:tgtEl>
+                                        <p:attrNameLst>
+                                          <p:attrName>style.visibility</p:attrName>
+                                        </p:attrNameLst>
+                                      </p:cBhvr>
+                                      <p:to>
+                                        <p:strVal val="visible"/>
+                                      </p:to>
+                                    </p:set>
+                                  </p:childTnLst>
+                                </p:cTn>
+                              </p:par>
+                            </p:childTnLst>
+                          </p:cTn>
+                        </p:par>
+                      </p:childTnLst>
+                    </p:cTn>
+                  </p:par>
+                  <p:par>
+                    <p:cTn id="15" fill="hold">
+                      <p:stCondLst>
+                        <p:cond delay="indefinite"/>
+                      </p:stCondLst>
+                      <p:childTnLst>
+                        <p:par>
+                          <p:cTn id="16" fill="hold">
+                            <p:stCondLst>
+                              <p:cond delay="0"/>
+                            </p:stCondLst>
+                            <p:childTnLst>
+                              <p:par>
+                                <p:cTn id="17" presetID="1" presetClass="entr" presetSubtype="0" fill="hold" grpId="0" nodeType="clickEffect">
+                                  <p:stCondLst>
+                                    <p:cond delay="0"/>
+                                  </p:stCondLst>
+                                  <p:childTnLst>
+                                    <p:set>
+                                      <p:cBhvr>
+                                        <p:cTn id="18" dur="1" fill="hold">
+                                          <p:stCondLst>
+                                            <p:cond delay="0"/>
+                                          </p:stCondLst>
+                                        </p:cTn>
+                                        <p:tgtEl>
+                                          <p:spTgt spid="3">
+                                            <p:txEl>
+                                              <p:pRg st="3" end="3"/>
+                                            </p:txEl>
+                                          </p:spTgt>
+                                        </p:tgtEl>
+                                        <p:attrNameLst>
+                                          <p:attrName>style.visibility</p:attrName>
+                                        </p:attrNameLst>
+                                      </p:cBhvr>
+                                      <p:to>
+                                        <p:strVal val="visible"/>
+                                      </p:to>
+                                    </p:set>
+                                  </p:childTnLst>
+                                </p:cTn>
+                              </p:par>
+                            </p:childTnLst>
+                          </p:cTn>
+                        </p:par>
+                      </p:childTnLst>
+                    </p:cTn>
+                  </p:par>
+                  <p:par>
+                    <p:cTn id="19" fill="hold">
+                      <p:stCondLst>
+                        <p:cond delay="indefinite"/>
+                      </p:stCondLst>
+                      <p:childTnLst>
+                        <p:par>
+                          <p:cTn id="20" fill="hold">
+                            <p:stCondLst>
+                              <p:cond delay="0"/>
+                            </p:stCondLst>
+                            <p:childTnLst>
+                              <p:par>
+                                <p:cTn id="21" presetID="1" presetClass="entr" presetSubtype="0" fill="hold" grpId="0" nodeType="clickEffect">
+                                  <p:stCondLst>
+                                    <p:cond delay="0"/>
+                                  </p:stCondLst>
+                                  <p:childTnLst>
+                                    <p:set>
+                                      <p:cBhvr>
+                                        <p:cTn id="22" dur="1" fill="hold">
+                                          <p:stCondLst>
+                                            <p:cond delay="0"/>
+                                          </p:stCondLst>
+                                        </p:cTn>
+                                        <p:tgtEl>
+                                          <p:spTgt spid="3">
+                                            <p:txEl>
+                                              <p:pRg st="4" end="4"/>
+                                            </p:txEl>
+                                          </p:spTgt>
+                                        </p:tgtEl>
+                                        <p:attrNameLst>
+                                          <p:attrName>style.visibility</p:attrName>
+                                        </p:attrNameLst>
+                                      </p:cBhvr>
+                                      <p:to>
+                                        <p:strVal val="visible"/>
+                                      </p:to>
+                                    </p:set>
+                                  </p:childTnLst>
+                                </p:cTn>
+                              </p:par>
+                            </p:childTnLst>
+                          </p:cTn>
+                        </p:par>
+                      </p:childTnLst>
+                    </p:cTn>
+                  </p:par>
+                  <p:par>
+                    <p:cTn id="23" fill="hold">
+                      <p:stCondLst>
+                        <p:cond delay="indefinite"/>
+                      </p:stCondLst>
+                      <p:childTnLst>
+                        <p:par>
+                          <p:cTn id="24" fill="hold">
+                            <p:stCondLst>
+                              <p:cond delay="0"/>
+                            </p:stCondLst>
+                            <p:childTnLst>
+                              <p:par>
+                                <p:cTn id="25" presetID="1" presetClass="entr" presetSubtype="0" fill="hold" grpId="0" nodeType="clickEffect">
+                                  <p:stCondLst>
+                                    <p:cond delay="0"/>
+                                  </p:stCondLst>
+                                  <p:childTnLst>
+                                    <p:set>
+                                      <p:cBhvr>
+                                        <p:cTn id="26" dur="1" fill="hold">
+                                          <p:stCondLst>
+                                            <p:cond delay="0"/>
+                                          </p:stCondLst>
+                                        </p:cTn>
+                                        <p:tgtEl>
+                                          <p:spTgt spid="3">
+                                            <p:txEl>
+                                              <p:pRg st="5" end="5"/>
+                                            </p:txEl>
+                                          </p:spTgt>
+                                        </p:tgtEl>
+                                        <p:attrNameLst>
+                                          <p:attrName>style.visibility</p:attrName>
+                                        </p:attrNameLst>
+                                      </p:cBhvr>
+                                      <p:to>
+                                        <p:strVal val="visible"/>
+                                      </p:to>
+                                    </p:set>
+                                  </p:childTnLst>
+                                </p:cTn>
+                              </p:par>
+                            </p:childTnLst>
+                          </p:cTn>
+                        </p:par>
+                      </p:childTnLst>
+                    </p:cTn>
+                  </p:par>
+                  <p:par>
+                    <p:cTn id="27" fill="hold">
+                      <p:stCondLst>
+                        <p:cond delay="indefinite"/>
+                      </p:stCondLst>
+                      <p:childTnLst>
+                        <p:par>
+                          <p:cTn id="28" fill="hold">
+                            <p:stCondLst>
+                              <p:cond delay="0"/>
+                            </p:stCondLst>
+                            <p:childTnLst>
+                              <p:par>
+                                <p:cTn id="29" presetID="1" presetClass="entr" presetSubtype="0" fill="hold" grpId="0" nodeType="clickEffect">
+                                  <p:stCondLst>
+                                    <p:cond delay="0"/>
+                                  </p:stCondLst>
+                                  <p:childTnLst>
+                                    <p:set>
+                                      <p:cBhvr>
+                                        <p:cTn id="30" dur="1" fill="hold">
+                                          <p:stCondLst>
+                                            <p:cond delay="0"/>
+                                          </p:stCondLst>
+                                        </p:cTn>
+                                        <p:tgtEl>
+                                          <p:spTgt spid="4">
+                                            <p:txEl>
+                                              <p:pRg st="0" end="0"/>
+                                            </p:txEl>
+                                          </p:spTgt>
+                                        </p:tgtEl>
+                                        <p:attrNameLst>
+                                          <p:attrName>style.visibility</p:attrName>
+                                        </p:attrNameLst>
+                                      </p:cBhvr>
+                                      <p:to>
+                                        <p:strVal val="visible"/>
+                                      </p:to>
+                                    </p:set>
+                                  </p:childTnLst>
+                                </p:cTn>
+                              </p:par>
+                            </p:childTnLst>
+                          </p:cTn>
+                        </p:par>
+                      </p:childTnLst>
+                    </p:cTn>
+                  </p:par>
+                  <p:par>
+                    <p:cTn id="31" fill="hold">
+                      <p:stCondLst>
+                        <p:cond delay="indefinite"/>
+                      </p:stCondLst>
+                      <p:childTnLst>
+                        <p:par>
+                          <p:cTn id="32" fill="hold">
+                            <p:stCondLst>
+                              <p:cond delay="0"/>
+                            </p:stCondLst>
+                            <p:childTnLst>
+                              <p:par>
+                                <p:cTn id="33" presetID="1" presetClass="entr" presetSubtype="0" fill="hold" grpId="0" nodeType="clickEffect">
+                                  <p:stCondLst>
+                                    <p:cond delay="0"/>
+                                  </p:stCondLst>
+                                  <p:childTnLst>
+                                    <p:set>
+                                      <p:cBhvr>
+                                        <p:cTn id="34" dur="1" fill="hold">
+                                          <p:stCondLst>
+                                            <p:cond delay="0"/>
+                                          </p:stCondLst>
+                                        </p:cTn>
+                                        <p:tgtEl>
+                                          <p:spTgt spid="4">
+                                            <p:txEl>
+                                              <p:pRg st="1" end="1"/>
+                                            </p:txEl>
+                                          </p:spTgt>
+                                        </p:tgtEl>
+                                        <p:attrNameLst>
+                                          <p:attrName>style.visibility</p:attrName>
+                                        </p:attrNameLst>
+                                      </p:cBhvr>
+                                      <p:to>
+                                        <p:strVal val="visible"/>
+                                      </p:to>
+                                    </p:set>
+                                  </p:childTnLst>
+                                </p:cTn>
+                              </p:par>
+                            </p:childTnLst>
+                          </p:cTn>
+                        </p:par>
+                      </p:childTnLst>
+                    </p:cTn>
+                  </p:par>
+                </p:childTnLst>
+              </p:cTn>
+              <p:prevCondLst>
+                <p:cond evt="onPrev" delay="0">
+                  <p:tgtEl>
+                    <p:sldTgt/>
+                  </p:tgtEl>
+                </p:cond>
+              </p:prevCondLst>
+              <p:nextCondLst>
+                <p:cond evt="onNext" delay="0">
+                  <p:tgtEl>
+                    <p:sldTgt/>
+                  </p:tgtEl>
+                </p:cond>
+              </p:nextCondLst>
+            </p:seq>
+          </p:childTnLst>
+        </p:cTn>
+      </p:par>
+    </p:tnLst>
+    <p:bldLst>
+      <p:bldP spid="3" grpId="0" build="p"/>
+      <p:bldP spid="4" grpId="0" build="p"/>
+    </p:bldLst>
+  </p:timing>
+</p:sld>
+</file>
+
+<file path=ppt/slides/slide21.xml><?xml version="1.0" encoding="utf-8"?>
+<p:sld xmlns:a="http://schemas.openxmlformats.org/drawingml/2006/main" xmlns:r="http://schemas.openxmlformats.org/officeDocument/2006/relationships" xmlns:p="http://schemas.openxmlformats.org/presentationml/2006/main">
+  <p:cSld>
+    <p:spTree>
+      <p:nvGrpSpPr>
+        <p:cNvPr id="1" name=""/>
+        <p:cNvGrpSpPr/>
+        <p:nvPr/>
+      </p:nvGrpSpPr>
+      <p:grpSpPr>
+        <a:xfrm>
+          <a:off x="0" y="0"/>
+          <a:ext cx="0" cy="0"/>
+          <a:chOff x="0" y="0"/>
+          <a:chExt cx="0" cy="0"/>
+        </a:xfrm>
+      </p:grpSpPr>
+      <p:sp>
+        <p:nvSpPr>
           <p:cNvPr id="2" name="Date Placeholder 1"/>
           <p:cNvSpPr>
             <a:spLocks noGrp="1"/>
@@ -13015,7 +13109,7 @@
           <a:p>
             <a:fld id="{FBD926E4-2B13-4465-A5B0-7D9EB9E6EE0C}" type="slidenum">
               <a:rPr lang="sv-SE" smtClean="0"/>
-              <a:t>20</a:t>
+              <a:t>21</a:t>
             </a:fld>
             <a:endParaRPr lang="sv-SE" dirty="0"/>
           </a:p>
@@ -15441,186 +15535,6 @@
 </p:sld>
 </file>
 
-<file path=ppt/slides/slide21.xml><?xml version="1.0" encoding="utf-8"?>
-<p:sld xmlns:a="http://schemas.openxmlformats.org/drawingml/2006/main" xmlns:r="http://schemas.openxmlformats.org/officeDocument/2006/relationships" xmlns:p="http://schemas.openxmlformats.org/presentationml/2006/main">
-  <p:cSld>
-    <p:spTree>
-      <p:nvGrpSpPr>
-        <p:cNvPr id="1" name=""/>
-        <p:cNvGrpSpPr/>
-        <p:nvPr/>
-      </p:nvGrpSpPr>
-      <p:grpSpPr>
-        <a:xfrm>
-          <a:off x="0" y="0"/>
-          <a:ext cx="0" cy="0"/>
-          <a:chOff x="0" y="0"/>
-          <a:chExt cx="0" cy="0"/>
-        </a:xfrm>
-      </p:grpSpPr>
-      <p:sp>
-        <p:nvSpPr>
-          <p:cNvPr id="2" name="Slide Number Placeholder 1"/>
-          <p:cNvSpPr>
-            <a:spLocks noGrp="1"/>
-          </p:cNvSpPr>
-          <p:nvPr>
-            <p:ph type="sldNum" sz="quarter" idx="12"/>
-          </p:nvPr>
-        </p:nvSpPr>
-        <p:spPr/>
-        <p:txBody>
-          <a:bodyPr/>
-          <a:lstStyle/>
-          <a:p>
-            <a:fld id="{FBD926E4-2B13-4465-A5B0-7D9EB9E6EE0C}" type="slidenum">
-              <a:rPr lang="sv-SE" smtClean="0"/>
-              <a:t>21</a:t>
-            </a:fld>
-            <a:endParaRPr lang="sv-SE" dirty="0"/>
-          </a:p>
-        </p:txBody>
-      </p:sp>
-      <p:sp>
-        <p:nvSpPr>
-          <p:cNvPr id="3" name="Title 2"/>
-          <p:cNvSpPr>
-            <a:spLocks noGrp="1"/>
-          </p:cNvSpPr>
-          <p:nvPr>
-            <p:ph type="title"/>
-          </p:nvPr>
-        </p:nvSpPr>
-        <p:spPr/>
-        <p:txBody>
-          <a:bodyPr>
-            <a:normAutofit/>
-          </a:bodyPr>
-          <a:lstStyle/>
-          <a:p>
-            <a:r>
-              <a:rPr lang="en-US" sz="1800" b="1" dirty="0" smtClean="0"/>
-              <a:t>Merging tool - Kdiff3</a:t>
-            </a:r>
-            <a:endParaRPr lang="en-US" sz="1800" b="1" dirty="0"/>
-          </a:p>
-        </p:txBody>
-      </p:sp>
-      <p:sp>
-        <p:nvSpPr>
-          <p:cNvPr id="4" name="Content Placeholder 3"/>
-          <p:cNvSpPr>
-            <a:spLocks noGrp="1"/>
-          </p:cNvSpPr>
-          <p:nvPr>
-            <p:ph sz="quarter" idx="13"/>
-          </p:nvPr>
-        </p:nvSpPr>
-        <p:spPr>
-          <a:xfrm>
-            <a:off x="539750" y="1340769"/>
-            <a:ext cx="8136706" cy="4584510"/>
-          </a:xfrm>
-        </p:spPr>
-        <p:txBody>
-          <a:bodyPr/>
-          <a:lstStyle/>
-          <a:p>
-            <a:pPr marL="285750" indent="-285750">
-              <a:buFont typeface="Arial"/>
-              <a:buChar char="•"/>
-            </a:pPr>
-            <a:r>
-              <a:rPr lang="en-US" sz="1800" dirty="0"/>
-              <a:t>Merging is necessary when several people work on the same files in a project. </a:t>
-            </a:r>
-          </a:p>
-          <a:p>
-            <a:pPr marL="285750" indent="-285750">
-              <a:buFont typeface="Arial"/>
-              <a:buChar char="•"/>
-            </a:pPr>
-            <a:endParaRPr lang="en-US" sz="1800" dirty="0"/>
-          </a:p>
-          <a:p>
-            <a:pPr marL="285750" indent="-285750">
-              <a:buFont typeface="Arial"/>
-              <a:buChar char="•"/>
-            </a:pPr>
-            <a:r>
-              <a:rPr lang="en-US" sz="1800" dirty="0"/>
-              <a:t>Kdiff3 can be used to merge two or three input files  by selecting the buttons A/B/C from the button bar and choose the source that should be used.</a:t>
-            </a:r>
-          </a:p>
-          <a:p>
-            <a:pPr marL="285750" indent="-285750">
-              <a:buFont typeface="Arial"/>
-              <a:buChar char="•"/>
-            </a:pPr>
-            <a:endParaRPr lang="en-US" sz="1800" dirty="0"/>
-          </a:p>
-          <a:p>
-            <a:pPr marL="285750" indent="-285750">
-              <a:buFont typeface="Arial"/>
-              <a:buChar char="•"/>
-            </a:pPr>
-            <a:r>
-              <a:rPr lang="en-US" sz="1800" dirty="0"/>
-              <a:t>Saving is disabled until all conflicts are resolved. </a:t>
-            </a:r>
-          </a:p>
-          <a:p>
-            <a:pPr marL="285750" indent="-285750">
-              <a:buFont typeface="Arial"/>
-              <a:buChar char="•"/>
-            </a:pPr>
-            <a:endParaRPr lang="en-US" sz="1800" dirty="0"/>
-          </a:p>
-          <a:p>
-            <a:pPr marL="285750" indent="-285750">
-              <a:buFont typeface="Arial"/>
-              <a:buChar char="•"/>
-            </a:pPr>
-            <a:r>
-              <a:rPr lang="en-US" sz="1800" dirty="0"/>
-              <a:t> Merge case– either B or input C changed but not both then change source automatically will be selected; if both has changed in the same line the conflict occurs and need to be resolved; B,C the same but not A then C is selected.</a:t>
-            </a:r>
-          </a:p>
-          <a:p>
-            <a:pPr marL="285750" indent="-285750">
-              <a:buFont typeface="Arial"/>
-              <a:buChar char="•"/>
-            </a:pPr>
-            <a:endParaRPr lang="en-US" sz="1800" dirty="0"/>
-          </a:p>
-          <a:p>
-            <a:endParaRPr lang="en-US" dirty="0"/>
-          </a:p>
-        </p:txBody>
-      </p:sp>
-    </p:spTree>
-    <p:extLst>
-      <p:ext uri="{BB962C8B-B14F-4D97-AF65-F5344CB8AC3E}">
-        <p14:creationId xmlns:p14="http://schemas.microsoft.com/office/powerpoint/2010/main" val="4066810392"/>
-      </p:ext>
-    </p:extLst>
-  </p:cSld>
-  <p:clrMapOvr>
-    <a:masterClrMapping/>
-  </p:clrMapOvr>
-  <p:transition spd="slow">
-    <p:push dir="u"/>
-  </p:transition>
-  <p:timing>
-    <p:tnLst>
-      <p:par>
-        <p:cTn id="1" dur="indefinite" restart="never" nodeType="tmRoot"/>
-      </p:par>
-    </p:tnLst>
-  </p:timing>
-</p:sld>
-</file>
-
 <file path=ppt/slides/slide22.xml><?xml version="1.0" encoding="utf-8"?>
 <p:sld xmlns:a="http://schemas.openxmlformats.org/drawingml/2006/main" xmlns:r="http://schemas.openxmlformats.org/officeDocument/2006/relationships" xmlns:p="http://schemas.openxmlformats.org/presentationml/2006/main">
   <p:cSld>
@@ -15656,6 +15570,186 @@
             <a:fld id="{FBD926E4-2B13-4465-A5B0-7D9EB9E6EE0C}" type="slidenum">
               <a:rPr lang="sv-SE" smtClean="0"/>
               <a:t>22</a:t>
+            </a:fld>
+            <a:endParaRPr lang="sv-SE" dirty="0"/>
+          </a:p>
+        </p:txBody>
+      </p:sp>
+      <p:sp>
+        <p:nvSpPr>
+          <p:cNvPr id="3" name="Title 2"/>
+          <p:cNvSpPr>
+            <a:spLocks noGrp="1"/>
+          </p:cNvSpPr>
+          <p:nvPr>
+            <p:ph type="title"/>
+          </p:nvPr>
+        </p:nvSpPr>
+        <p:spPr/>
+        <p:txBody>
+          <a:bodyPr>
+            <a:normAutofit/>
+          </a:bodyPr>
+          <a:lstStyle/>
+          <a:p>
+            <a:r>
+              <a:rPr lang="en-US" sz="1800" b="1" dirty="0" smtClean="0"/>
+              <a:t>Merging tool - Kdiff3</a:t>
+            </a:r>
+            <a:endParaRPr lang="en-US" sz="1800" b="1" dirty="0"/>
+          </a:p>
+        </p:txBody>
+      </p:sp>
+      <p:sp>
+        <p:nvSpPr>
+          <p:cNvPr id="4" name="Content Placeholder 3"/>
+          <p:cNvSpPr>
+            <a:spLocks noGrp="1"/>
+          </p:cNvSpPr>
+          <p:nvPr>
+            <p:ph sz="quarter" idx="13"/>
+          </p:nvPr>
+        </p:nvSpPr>
+        <p:spPr>
+          <a:xfrm>
+            <a:off x="539750" y="1340769"/>
+            <a:ext cx="8136706" cy="4584510"/>
+          </a:xfrm>
+        </p:spPr>
+        <p:txBody>
+          <a:bodyPr/>
+          <a:lstStyle/>
+          <a:p>
+            <a:pPr marL="285750" indent="-285750">
+              <a:buFont typeface="Arial"/>
+              <a:buChar char="•"/>
+            </a:pPr>
+            <a:r>
+              <a:rPr lang="en-US" sz="1800" dirty="0"/>
+              <a:t>Merging is necessary when several people work on the same files in a project. </a:t>
+            </a:r>
+          </a:p>
+          <a:p>
+            <a:pPr marL="285750" indent="-285750">
+              <a:buFont typeface="Arial"/>
+              <a:buChar char="•"/>
+            </a:pPr>
+            <a:endParaRPr lang="en-US" sz="1800" dirty="0"/>
+          </a:p>
+          <a:p>
+            <a:pPr marL="285750" indent="-285750">
+              <a:buFont typeface="Arial"/>
+              <a:buChar char="•"/>
+            </a:pPr>
+            <a:r>
+              <a:rPr lang="en-US" sz="1800" dirty="0"/>
+              <a:t>Kdiff3 can be used to merge two or three input files  by selecting the buttons A/B/C from the button bar and choose the source that should be used.</a:t>
+            </a:r>
+          </a:p>
+          <a:p>
+            <a:pPr marL="285750" indent="-285750">
+              <a:buFont typeface="Arial"/>
+              <a:buChar char="•"/>
+            </a:pPr>
+            <a:endParaRPr lang="en-US" sz="1800" dirty="0"/>
+          </a:p>
+          <a:p>
+            <a:pPr marL="285750" indent="-285750">
+              <a:buFont typeface="Arial"/>
+              <a:buChar char="•"/>
+            </a:pPr>
+            <a:r>
+              <a:rPr lang="en-US" sz="1800" dirty="0"/>
+              <a:t>Saving is disabled until all conflicts are resolved. </a:t>
+            </a:r>
+          </a:p>
+          <a:p>
+            <a:pPr marL="285750" indent="-285750">
+              <a:buFont typeface="Arial"/>
+              <a:buChar char="•"/>
+            </a:pPr>
+            <a:endParaRPr lang="en-US" sz="1800" dirty="0"/>
+          </a:p>
+          <a:p>
+            <a:pPr marL="285750" indent="-285750">
+              <a:buFont typeface="Arial"/>
+              <a:buChar char="•"/>
+            </a:pPr>
+            <a:r>
+              <a:rPr lang="en-US" sz="1800" dirty="0"/>
+              <a:t> Merge case– either B or input C changed but not both then change source automatically will be selected; if both has changed in the same line the conflict occurs and need to be resolved; B,C the same but not A then C is selected.</a:t>
+            </a:r>
+          </a:p>
+          <a:p>
+            <a:pPr marL="285750" indent="-285750">
+              <a:buFont typeface="Arial"/>
+              <a:buChar char="•"/>
+            </a:pPr>
+            <a:endParaRPr lang="en-US" sz="1800" dirty="0"/>
+          </a:p>
+          <a:p>
+            <a:endParaRPr lang="en-US" dirty="0"/>
+          </a:p>
+        </p:txBody>
+      </p:sp>
+    </p:spTree>
+    <p:extLst>
+      <p:ext uri="{BB962C8B-B14F-4D97-AF65-F5344CB8AC3E}">
+        <p14:creationId xmlns:p14="http://schemas.microsoft.com/office/powerpoint/2010/main" val="4066810392"/>
+      </p:ext>
+    </p:extLst>
+  </p:cSld>
+  <p:clrMapOvr>
+    <a:masterClrMapping/>
+  </p:clrMapOvr>
+  <p:transition spd="slow">
+    <p:push dir="u"/>
+  </p:transition>
+  <p:timing>
+    <p:tnLst>
+      <p:par>
+        <p:cTn id="1" dur="indefinite" restart="never" nodeType="tmRoot"/>
+      </p:par>
+    </p:tnLst>
+  </p:timing>
+</p:sld>
+</file>
+
+<file path=ppt/slides/slide23.xml><?xml version="1.0" encoding="utf-8"?>
+<p:sld xmlns:a="http://schemas.openxmlformats.org/drawingml/2006/main" xmlns:r="http://schemas.openxmlformats.org/officeDocument/2006/relationships" xmlns:p="http://schemas.openxmlformats.org/presentationml/2006/main">
+  <p:cSld>
+    <p:spTree>
+      <p:nvGrpSpPr>
+        <p:cNvPr id="1" name=""/>
+        <p:cNvGrpSpPr/>
+        <p:nvPr/>
+      </p:nvGrpSpPr>
+      <p:grpSpPr>
+        <a:xfrm>
+          <a:off x="0" y="0"/>
+          <a:ext cx="0" cy="0"/>
+          <a:chOff x="0" y="0"/>
+          <a:chExt cx="0" cy="0"/>
+        </a:xfrm>
+      </p:grpSpPr>
+      <p:sp>
+        <p:nvSpPr>
+          <p:cNvPr id="2" name="Slide Number Placeholder 1"/>
+          <p:cNvSpPr>
+            <a:spLocks noGrp="1"/>
+          </p:cNvSpPr>
+          <p:nvPr>
+            <p:ph type="sldNum" sz="quarter" idx="12"/>
+          </p:nvPr>
+        </p:nvSpPr>
+        <p:spPr/>
+        <p:txBody>
+          <a:bodyPr/>
+          <a:lstStyle/>
+          <a:p>
+            <a:fld id="{FBD926E4-2B13-4465-A5B0-7D9EB9E6EE0C}" type="slidenum">
+              <a:rPr lang="sv-SE" smtClean="0"/>
+              <a:t>23</a:t>
             </a:fld>
             <a:endParaRPr lang="sv-SE" dirty="0"/>
           </a:p>

</xml_diff>

<commit_message>
La till referenser till lean principles
</commit_message>
<xml_diff>
--- a/Git-introduktion_Hermods_HiQ.pptx
+++ b/Git-introduktion_Hermods_HiQ.pptx
@@ -222,7 +222,7 @@
             <a:fld id="{45CFCF10-915A-49F5-B6D7-514E231DCDF1}" type="datetimeFigureOut">
               <a:rPr lang="en-US" smtClean="0"/>
               <a:pPr/>
-              <a:t>2/18/2015</a:t>
+              <a:t>2/19/2015</a:t>
             </a:fld>
             <a:endParaRPr lang="en-US"/>
           </a:p>
@@ -389,7 +389,7 @@
             <a:fld id="{6FD0678E-F882-4F2D-B288-7FD22A23E63D}" type="datetimeFigureOut">
               <a:rPr lang="en-US" smtClean="0"/>
               <a:pPr/>
-              <a:t>2/18/2015</a:t>
+              <a:t>2/19/2015</a:t>
             </a:fld>
             <a:endParaRPr lang="en-US"/>
           </a:p>
@@ -1132,7 +1132,7 @@
             <a:fld id="{4612DF9C-874E-47D4-81D0-65C9DE5115B7}" type="datetime1">
               <a:rPr lang="en-US" smtClean="0"/>
               <a:pPr/>
-              <a:t>2/18/2015</a:t>
+              <a:t>2/19/2015</a:t>
             </a:fld>
             <a:endParaRPr lang="en-US"/>
           </a:p>
@@ -1190,7 +1190,7 @@
           <a:p>
             <a:fld id="{72F8B864-2A5B-4B57-9C52-476B6FC89539}" type="datetime1">
               <a:rPr lang="sv-SE" smtClean="0"/>
-              <a:t>2015-02-18</a:t>
+              <a:t>2015-02-19</a:t>
             </a:fld>
             <a:endParaRPr lang="sv-SE" dirty="0"/>
           </a:p>
@@ -2085,7 +2085,7 @@
             <a:fld id="{3000F0DF-1E7D-4DBD-833B-E7E7F0E29C0F}" type="datetime1">
               <a:rPr lang="en-US" smtClean="0"/>
               <a:pPr/>
-              <a:t>2/18/2015</a:t>
+              <a:t>2/19/2015</a:t>
             </a:fld>
             <a:endParaRPr lang="en-US"/>
           </a:p>
@@ -2260,7 +2260,7 @@
             <a:fld id="{F1F58A51-BF2E-42AC-8E65-C585A8BA80BA}" type="datetime1">
               <a:rPr lang="en-US" smtClean="0"/>
               <a:pPr/>
-              <a:t>2/18/2015</a:t>
+              <a:t>2/19/2015</a:t>
             </a:fld>
             <a:endParaRPr lang="en-US"/>
           </a:p>
@@ -2881,7 +2881,7 @@
             <a:fld id="{F1F58A51-BF2E-42AC-8E65-C585A8BA80BA}" type="datetime1">
               <a:rPr lang="en-US" smtClean="0"/>
               <a:pPr/>
-              <a:t>2/18/2015</a:t>
+              <a:t>2/19/2015</a:t>
             </a:fld>
             <a:endParaRPr lang="en-US"/>
           </a:p>
@@ -3180,7 +3180,7 @@
             <a:fld id="{3000F0DF-1E7D-4DBD-833B-E7E7F0E29C0F}" type="datetime1">
               <a:rPr lang="en-US" smtClean="0"/>
               <a:pPr/>
-              <a:t>2/18/2015</a:t>
+              <a:t>2/19/2015</a:t>
             </a:fld>
             <a:endParaRPr lang="en-US"/>
           </a:p>
@@ -3618,7 +3618,7 @@
             <a:fld id="{475D2F3D-312F-4B9D-A6D5-98FA0DBD9BEB}" type="datetime1">
               <a:rPr lang="en-US" smtClean="0"/>
               <a:pPr/>
-              <a:t>2/18/2015</a:t>
+              <a:t>2/19/2015</a:t>
             </a:fld>
             <a:endParaRPr lang="en-US"/>
           </a:p>
@@ -3736,7 +3736,7 @@
             <a:fld id="{1F2B999D-B673-4BF6-AFED-DE82BB78A551}" type="datetime1">
               <a:rPr lang="en-US" smtClean="0"/>
               <a:pPr/>
-              <a:t>2/18/2015</a:t>
+              <a:t>2/19/2015</a:t>
             </a:fld>
             <a:endParaRPr lang="en-US"/>
           </a:p>
@@ -3986,7 +3986,7 @@
             <a:fld id="{15EE75C9-4165-49D6-889E-AD319E617BC4}" type="datetime1">
               <a:rPr lang="en-US" smtClean="0"/>
               <a:pPr/>
-              <a:t>2/18/2015</a:t>
+              <a:t>2/19/2015</a:t>
             </a:fld>
             <a:endParaRPr lang="en-US"/>
           </a:p>
@@ -4571,7 +4571,7 @@
             <a:fld id="{A0D14760-8281-4D63-AA62-EE78DA6EC742}" type="datetime1">
               <a:rPr lang="en-US" smtClean="0"/>
               <a:pPr/>
-              <a:t>2/18/2015</a:t>
+              <a:t>2/19/2015</a:t>
             </a:fld>
             <a:endParaRPr lang="en-US"/>
           </a:p>
@@ -5127,7 +5127,7 @@
             <a:fld id="{4062407C-A2E4-4F88-9519-110C5AA102FA}" type="datetime1">
               <a:rPr lang="en-US" smtClean="0"/>
               <a:pPr/>
-              <a:t>2/18/2015</a:t>
+              <a:t>2/19/2015</a:t>
             </a:fld>
             <a:endParaRPr lang="en-US"/>
           </a:p>
@@ -12496,7 +12496,7 @@
           </a:prstGeom>
           <a:extLst>
             <a:ext uri="{FAA26D3D-D897-4be2-8F04-BA451C77F1D7}">
-              <ma14:placeholderFlag xmlns:wpc="http://schemas.microsoft.com/office/word/2010/wordprocessingCanvas" xmlns:mc="http://schemas.openxmlformats.org/markup-compatibility/2006" xmlns:m="http://schemas.openxmlformats.org/officeDocument/2006/math" xmlns:wp14="http://schemas.microsoft.com/office/word/2010/wordprocessingDrawing" xmlns:wp="http://schemas.openxmlformats.org/drawingml/2006/wordprocessingDrawing" xmlns:w14="http://schemas.microsoft.com/office/word/2010/wordml" xmlns:wpg="http://schemas.microsoft.com/office/word/2010/wordprocessingGroup" xmlns:wpi="http://schemas.microsoft.com/office/word/2010/wordprocessingInk" xmlns:wne="http://schemas.microsoft.com/office/word/2006/wordml" xmlns:wps="http://schemas.microsoft.com/office/word/2010/wordprocessingShape" xmlns:pic="http://schemas.openxmlformats.org/drawingml/2006/picture" xmlns="" xmlns:mo="http://schemas.microsoft.com/office/mac/office/2008/main" xmlns:mv="urn:schemas-microsoft-com:mac:vml" xmlns:o="urn:schemas-microsoft-com:office:office" xmlns:v="urn:schemas-microsoft-com:vml" xmlns:w10="urn:schemas-microsoft-com:office:word" xmlns:w="http://schemas.openxmlformats.org/wordprocessingml/2006/main" xmlns:ma14="http://schemas.microsoft.com/office/mac/drawingml/2011/main" xmlns:ve="http://schemas.openxmlformats.org/markup-compatibility/2006" xmlns:lc="http://schemas.openxmlformats.org/drawingml/2006/lockedCanvas"/>
+              <ma14:placeholderFlag xmlns:lc="http://schemas.openxmlformats.org/drawingml/2006/lockedCanvas" xmlns:ve="http://schemas.openxmlformats.org/markup-compatibility/2006" xmlns:ma14="http://schemas.microsoft.com/office/mac/drawingml/2011/main" xmlns:w="http://schemas.openxmlformats.org/wordprocessingml/2006/main" xmlns:w10="urn:schemas-microsoft-com:office:word" xmlns:v="urn:schemas-microsoft-com:vml" xmlns:o="urn:schemas-microsoft-com:office:office" xmlns:mv="urn:schemas-microsoft-com:mac:vml" xmlns:mo="http://schemas.microsoft.com/office/mac/office/2008/main" xmlns="" xmlns:pic="http://schemas.openxmlformats.org/drawingml/2006/picture" xmlns:wps="http://schemas.microsoft.com/office/word/2010/wordprocessingShape" xmlns:wne="http://schemas.microsoft.com/office/word/2006/wordml" xmlns:wpi="http://schemas.microsoft.com/office/word/2010/wordprocessingInk" xmlns:wpg="http://schemas.microsoft.com/office/word/2010/wordprocessingGroup" xmlns:w14="http://schemas.microsoft.com/office/word/2010/wordml" xmlns:wp="http://schemas.openxmlformats.org/drawingml/2006/wordprocessingDrawing" xmlns:wp14="http://schemas.microsoft.com/office/word/2010/wordprocessingDrawing" xmlns:m="http://schemas.openxmlformats.org/officeDocument/2006/math" xmlns:mc="http://schemas.openxmlformats.org/markup-compatibility/2006" xmlns:wpc="http://schemas.microsoft.com/office/word/2010/wordprocessingCanvas"/>
             </a:ext>
           </a:extLst>
         </p:spPr>
@@ -14089,7 +14089,7 @@
           <a:p>
             <a:fld id="{72F8B864-2A5B-4B57-9C52-476B6FC89539}" type="datetime1">
               <a:rPr lang="sv-SE" smtClean="0"/>
-              <a:t>2015-02-18</a:t>
+              <a:t>2015-02-19</a:t>
             </a:fld>
             <a:endParaRPr lang="sv-SE" dirty="0"/>
           </a:p>
@@ -22332,6 +22332,110 @@
               <a:rPr lang="sv-SE" dirty="0" err="1" smtClean="0"/>
               <a:t>environment</a:t>
             </a:r>
+            <a:endParaRPr lang="sv-SE" dirty="0" smtClean="0"/>
+          </a:p>
+          <a:p>
+            <a:r>
+              <a:rPr lang="sv-SE" dirty="0" err="1"/>
+              <a:t>Good</a:t>
+            </a:r>
+            <a:r>
+              <a:rPr lang="sv-SE" dirty="0"/>
+              <a:t> CM is </a:t>
+            </a:r>
+            <a:r>
+              <a:rPr lang="sv-SE" dirty="0" err="1"/>
+              <a:t>essential</a:t>
+            </a:r>
+            <a:r>
+              <a:rPr lang="sv-SE" dirty="0"/>
+              <a:t> </a:t>
+            </a:r>
+            <a:r>
+              <a:rPr lang="sv-SE" dirty="0" err="1"/>
+              <a:t>to</a:t>
+            </a:r>
+            <a:r>
+              <a:rPr lang="sv-SE" dirty="0"/>
+              <a:t> </a:t>
+            </a:r>
+            <a:r>
+              <a:rPr lang="sv-SE" dirty="0" err="1"/>
+              <a:t>enable</a:t>
+            </a:r>
+            <a:r>
+              <a:rPr lang="sv-SE" dirty="0"/>
+              <a:t> the </a:t>
+            </a:r>
+            <a:r>
+              <a:rPr lang="sv-SE" dirty="0" err="1">
+                <a:hlinkClick r:id="rId2"/>
+              </a:rPr>
+              <a:t>lean</a:t>
+            </a:r>
+            <a:r>
+              <a:rPr lang="sv-SE" dirty="0">
+                <a:hlinkClick r:id="rId2"/>
+              </a:rPr>
+              <a:t> </a:t>
+            </a:r>
+            <a:r>
+              <a:rPr lang="sv-SE" dirty="0" smtClean="0">
+                <a:hlinkClick r:id="rId2"/>
+              </a:rPr>
+              <a:t>principles</a:t>
+            </a:r>
+            <a:endParaRPr lang="sv-SE" dirty="0" smtClean="0"/>
+          </a:p>
+          <a:p>
+            <a:r>
+              <a:rPr lang="sv-SE" dirty="0" smtClean="0">
+                <a:hlinkClick r:id="rId3"/>
+              </a:rPr>
+              <a:t>Stop the </a:t>
+            </a:r>
+            <a:r>
+              <a:rPr lang="sv-SE" dirty="0" err="1" smtClean="0">
+                <a:hlinkClick r:id="rId3"/>
+              </a:rPr>
+              <a:t>line</a:t>
+            </a:r>
+            <a:r>
+              <a:rPr lang="sv-SE" dirty="0" smtClean="0"/>
+              <a:t> so the </a:t>
+            </a:r>
+            <a:r>
+              <a:rPr lang="sv-SE" dirty="0" err="1" smtClean="0"/>
+              <a:t>line</a:t>
+            </a:r>
+            <a:r>
+              <a:rPr lang="sv-SE" dirty="0" smtClean="0"/>
+              <a:t> never stops (and </a:t>
+            </a:r>
+            <a:r>
+              <a:rPr lang="sv-SE" dirty="0" err="1" smtClean="0"/>
+              <a:t>keep</a:t>
+            </a:r>
+            <a:r>
+              <a:rPr lang="sv-SE" dirty="0" smtClean="0"/>
+              <a:t> the </a:t>
+            </a:r>
+            <a:r>
+              <a:rPr lang="sv-SE" dirty="0" err="1" smtClean="0"/>
+              <a:t>floors</a:t>
+            </a:r>
+            <a:r>
+              <a:rPr lang="sv-SE" dirty="0" smtClean="0"/>
+              <a:t> </a:t>
+            </a:r>
+            <a:r>
+              <a:rPr lang="sv-SE" dirty="0" err="1" smtClean="0"/>
+              <a:t>clean</a:t>
+            </a:r>
+            <a:r>
+              <a:rPr lang="sv-SE" dirty="0" smtClean="0"/>
+              <a:t>)</a:t>
+            </a:r>
             <a:endParaRPr lang="sv-SE" dirty="0"/>
           </a:p>
         </p:txBody>
@@ -22369,7 +22473,7 @@
           <p:nvPr/>
         </p:nvPicPr>
         <p:blipFill>
-          <a:blip r:embed="rId2">
+          <a:blip r:embed="rId4">
             <a:extLst>
               <a:ext uri="{28A0092B-C50C-407E-A947-70E740481C1C}">
                 <a14:useLocalDpi xmlns:a14="http://schemas.microsoft.com/office/drawing/2010/main"/>
@@ -22423,7 +22527,7 @@
           <p:nvPr/>
         </p:nvPicPr>
         <p:blipFill>
-          <a:blip r:embed="rId3">
+          <a:blip r:embed="rId5">
             <a:extLst>
               <a:ext uri="{28A0092B-C50C-407E-A947-70E740481C1C}">
                 <a14:useLocalDpi xmlns:a14="http://schemas.microsoft.com/office/drawing/2010/main"/>
@@ -22567,6 +22671,104 @@
                                           <p:spTgt spid="3">
                                             <p:txEl>
                                               <p:pRg st="1" end="1"/>
+                                            </p:txEl>
+                                          </p:spTgt>
+                                        </p:tgtEl>
+                                        <p:attrNameLst>
+                                          <p:attrName>style.visibility</p:attrName>
+                                        </p:attrNameLst>
+                                      </p:cBhvr>
+                                      <p:to>
+                                        <p:strVal val="visible"/>
+                                      </p:to>
+                                    </p:set>
+                                  </p:childTnLst>
+                                </p:cTn>
+                              </p:par>
+                            </p:childTnLst>
+                          </p:cTn>
+                        </p:par>
+                      </p:childTnLst>
+                    </p:cTn>
+                  </p:par>
+                  <p:par>
+                    <p:cTn id="11" fill="hold">
+                      <p:stCondLst>
+                        <p:cond delay="indefinite"/>
+                      </p:stCondLst>
+                      <p:childTnLst>
+                        <p:par>
+                          <p:cTn id="12" fill="hold">
+                            <p:stCondLst>
+                              <p:cond delay="0"/>
+                            </p:stCondLst>
+                            <p:childTnLst>
+                              <p:par>
+                                <p:cTn id="13" presetID="1" presetClass="entr" presetSubtype="0" fill="hold" nodeType="clickEffect">
+                                  <p:stCondLst>
+                                    <p:cond delay="0"/>
+                                  </p:stCondLst>
+                                  <p:childTnLst>
+                                    <p:set>
+                                      <p:cBhvr>
+                                        <p:cTn id="14" dur="1" fill="hold">
+                                          <p:stCondLst>
+                                            <p:cond delay="0"/>
+                                          </p:stCondLst>
+                                        </p:cTn>
+                                        <p:tgtEl>
+                                          <p:spTgt spid="3">
+                                            <p:txEl>
+                                              <p:pRg st="2" end="2"/>
+                                            </p:txEl>
+                                          </p:spTgt>
+                                        </p:tgtEl>
+                                        <p:attrNameLst>
+                                          <p:attrName>style.visibility</p:attrName>
+                                        </p:attrNameLst>
+                                      </p:cBhvr>
+                                      <p:to>
+                                        <p:strVal val="visible"/>
+                                      </p:to>
+                                    </p:set>
+                                  </p:childTnLst>
+                                </p:cTn>
+                              </p:par>
+                            </p:childTnLst>
+                          </p:cTn>
+                        </p:par>
+                      </p:childTnLst>
+                    </p:cTn>
+                  </p:par>
+                  <p:par>
+                    <p:cTn id="15" fill="hold">
+                      <p:stCondLst>
+                        <p:cond delay="indefinite"/>
+                      </p:stCondLst>
+                      <p:childTnLst>
+                        <p:par>
+                          <p:cTn id="16" fill="hold">
+                            <p:stCondLst>
+                              <p:cond delay="0"/>
+                            </p:stCondLst>
+                            <p:childTnLst>
+                              <p:par>
+                                <p:cTn id="17" presetID="1" presetClass="entr" presetSubtype="0" fill="hold" nodeType="clickEffect">
+                                  <p:stCondLst>
+                                    <p:cond delay="0"/>
+                                  </p:stCondLst>
+                                  <p:childTnLst>
+                                    <p:set>
+                                      <p:cBhvr>
+                                        <p:cTn id="18" dur="1" fill="hold">
+                                          <p:stCondLst>
+                                            <p:cond delay="0"/>
+                                          </p:stCondLst>
+                                        </p:cTn>
+                                        <p:tgtEl>
+                                          <p:spTgt spid="3">
+                                            <p:txEl>
+                                              <p:pRg st="3" end="3"/>
                                             </p:txEl>
                                           </p:spTgt>
                                         </p:tgtEl>

</xml_diff>